<commit_message>
Doc edits per meeting with Dave May
</commit_message>
<xml_diff>
--- a/docs/images/Duo-MFA-architecture.pptx
+++ b/docs/images/Duo-MFA-architecture.pptx
@@ -112,11 +112,11 @@
         <p14:section name="Use" id="{13362554-1F3A-4F7D-B9EB-E7B8B4D8573B}">
           <p14:sldIdLst>
             <p14:sldId id="256"/>
-            <p14:sldId id="258"/>
           </p14:sldIdLst>
         </p14:section>
         <p14:section name="Old" id="{E71A7BEC-62E3-45B9-A171-C16E0E8C85D7}">
           <p14:sldIdLst>
+            <p14:sldId id="258"/>
             <p14:sldId id="257"/>
           </p14:sldIdLst>
         </p14:section>
@@ -260,7 +260,7 @@
           <a:p>
             <a:fld id="{6E535ED2-9B9C-684A-B3DF-5A4A64DFB4BE}" type="datetimeFigureOut">
               <a:rPr lang="en-US" smtClean="0"/>
-              <a:t>5/27/2021</a:t>
+              <a:t>5/28/2021</a:t>
             </a:fld>
             <a:endParaRPr lang="en-US" dirty="0"/>
           </a:p>
@@ -430,7 +430,7 @@
           <a:p>
             <a:fld id="{6E535ED2-9B9C-684A-B3DF-5A4A64DFB4BE}" type="datetimeFigureOut">
               <a:rPr lang="en-US" smtClean="0"/>
-              <a:t>5/27/2021</a:t>
+              <a:t>5/28/2021</a:t>
             </a:fld>
             <a:endParaRPr lang="en-US" dirty="0"/>
           </a:p>
@@ -610,7 +610,7 @@
           <a:p>
             <a:fld id="{6E535ED2-9B9C-684A-B3DF-5A4A64DFB4BE}" type="datetimeFigureOut">
               <a:rPr lang="en-US" smtClean="0"/>
-              <a:t>5/27/2021</a:t>
+              <a:t>5/28/2021</a:t>
             </a:fld>
             <a:endParaRPr lang="en-US" dirty="0"/>
           </a:p>
@@ -780,7 +780,7 @@
           <a:p>
             <a:fld id="{6E535ED2-9B9C-684A-B3DF-5A4A64DFB4BE}" type="datetimeFigureOut">
               <a:rPr lang="en-US" smtClean="0"/>
-              <a:t>5/27/2021</a:t>
+              <a:t>5/28/2021</a:t>
             </a:fld>
             <a:endParaRPr lang="en-US" dirty="0"/>
           </a:p>
@@ -1024,7 +1024,7 @@
           <a:p>
             <a:fld id="{6E535ED2-9B9C-684A-B3DF-5A4A64DFB4BE}" type="datetimeFigureOut">
               <a:rPr lang="en-US" smtClean="0"/>
-              <a:t>5/27/2021</a:t>
+              <a:t>5/28/2021</a:t>
             </a:fld>
             <a:endParaRPr lang="en-US" dirty="0"/>
           </a:p>
@@ -1256,7 +1256,7 @@
           <a:p>
             <a:fld id="{6E535ED2-9B9C-684A-B3DF-5A4A64DFB4BE}" type="datetimeFigureOut">
               <a:rPr lang="en-US" smtClean="0"/>
-              <a:t>5/27/2021</a:t>
+              <a:t>5/28/2021</a:t>
             </a:fld>
             <a:endParaRPr lang="en-US" dirty="0"/>
           </a:p>
@@ -1623,7 +1623,7 @@
           <a:p>
             <a:fld id="{6E535ED2-9B9C-684A-B3DF-5A4A64DFB4BE}" type="datetimeFigureOut">
               <a:rPr lang="en-US" smtClean="0"/>
-              <a:t>5/27/2021</a:t>
+              <a:t>5/28/2021</a:t>
             </a:fld>
             <a:endParaRPr lang="en-US" dirty="0"/>
           </a:p>
@@ -1741,7 +1741,7 @@
           <a:p>
             <a:fld id="{6E535ED2-9B9C-684A-B3DF-5A4A64DFB4BE}" type="datetimeFigureOut">
               <a:rPr lang="en-US" smtClean="0"/>
-              <a:t>5/27/2021</a:t>
+              <a:t>5/28/2021</a:t>
             </a:fld>
             <a:endParaRPr lang="en-US" dirty="0"/>
           </a:p>
@@ -1836,7 +1836,7 @@
           <a:p>
             <a:fld id="{6E535ED2-9B9C-684A-B3DF-5A4A64DFB4BE}" type="datetimeFigureOut">
               <a:rPr lang="en-US" smtClean="0"/>
-              <a:t>5/27/2021</a:t>
+              <a:t>5/28/2021</a:t>
             </a:fld>
             <a:endParaRPr lang="en-US" dirty="0"/>
           </a:p>
@@ -2113,7 +2113,7 @@
           <a:p>
             <a:fld id="{6E535ED2-9B9C-684A-B3DF-5A4A64DFB4BE}" type="datetimeFigureOut">
               <a:rPr lang="en-US" smtClean="0"/>
-              <a:t>5/27/2021</a:t>
+              <a:t>5/28/2021</a:t>
             </a:fld>
             <a:endParaRPr lang="en-US" dirty="0"/>
           </a:p>
@@ -2281,7 +2281,7 @@
           </a:lstStyle>
           <a:p>
             <a:r>
-              <a:rPr lang="en-US" smtClean="0"/>
+              <a:rPr lang="en-US" dirty="0" smtClean="0"/>
               <a:t>Click icon to add picture</a:t>
             </a:r>
             <a:endParaRPr lang="en-US" dirty="0"/>
@@ -2370,7 +2370,7 @@
           <a:p>
             <a:fld id="{6E535ED2-9B9C-684A-B3DF-5A4A64DFB4BE}" type="datetimeFigureOut">
               <a:rPr lang="en-US" smtClean="0"/>
-              <a:t>5/27/2021</a:t>
+              <a:t>5/28/2021</a:t>
             </a:fld>
             <a:endParaRPr lang="en-US" dirty="0"/>
           </a:p>
@@ -2583,7 +2583,7 @@
           <a:p>
             <a:fld id="{6E535ED2-9B9C-684A-B3DF-5A4A64DFB4BE}" type="datetimeFigureOut">
               <a:rPr lang="en-US" smtClean="0"/>
-              <a:t>5/27/2021</a:t>
+              <a:t>5/28/2021</a:t>
             </a:fld>
             <a:endParaRPr lang="en-US" dirty="0"/>
           </a:p>
@@ -3002,7 +3002,7 @@
         </p:nvSpPr>
         <p:spPr>
           <a:xfrm>
-            <a:off x="1828800" y="1371600"/>
+            <a:off x="1219200" y="685800"/>
             <a:ext cx="12344400" cy="7680964"/>
           </a:xfrm>
           <a:prstGeom prst="rect">
@@ -3080,7 +3080,7 @@
         </p:blipFill>
         <p:spPr bwMode="auto">
           <a:xfrm>
-            <a:off x="1828800" y="1371600"/>
+            <a:off x="1219200" y="685800"/>
             <a:ext cx="396240" cy="396240"/>
           </a:xfrm>
           <a:prstGeom prst="rect">
@@ -3125,7 +3125,7 @@
         </p:nvSpPr>
         <p:spPr>
           <a:xfrm>
-            <a:off x="5186173" y="4848496"/>
+            <a:off x="4576573" y="4162696"/>
             <a:ext cx="5725243" cy="3953370"/>
           </a:xfrm>
           <a:prstGeom prst="rect">
@@ -3204,7 +3204,7 @@
         </p:blipFill>
         <p:spPr bwMode="auto">
           <a:xfrm>
-            <a:off x="5180687" y="4848494"/>
+            <a:off x="4571087" y="4162694"/>
             <a:ext cx="396240" cy="396240"/>
           </a:xfrm>
           <a:prstGeom prst="rect">
@@ -3249,7 +3249,7 @@
         </p:nvSpPr>
         <p:spPr>
           <a:xfrm>
-            <a:off x="5674222" y="4525413"/>
+            <a:off x="5064622" y="3839613"/>
             <a:ext cx="1841795" cy="4398419"/>
           </a:xfrm>
           <a:prstGeom prst="rect">
@@ -3313,7 +3313,7 @@
         </p:nvSpPr>
         <p:spPr>
           <a:xfrm>
-            <a:off x="8907143" y="4525413"/>
+            <a:off x="8297543" y="3839613"/>
             <a:ext cx="1853455" cy="4398419"/>
           </a:xfrm>
           <a:prstGeom prst="rect">
@@ -3377,7 +3377,7 @@
         </p:nvSpPr>
         <p:spPr>
           <a:xfrm>
-            <a:off x="5813725" y="6737506"/>
+            <a:off x="5204125" y="6051706"/>
             <a:ext cx="1613200" cy="1972072"/>
           </a:xfrm>
           <a:prstGeom prst="rect">
@@ -3465,7 +3465,7 @@
         </p:blipFill>
         <p:spPr bwMode="auto">
           <a:xfrm>
-            <a:off x="5813724" y="6737504"/>
+            <a:off x="5204124" y="6051704"/>
             <a:ext cx="351626" cy="329566"/>
           </a:xfrm>
           <a:prstGeom prst="rect">
@@ -3510,7 +3510,7 @@
         </p:nvSpPr>
         <p:spPr>
           <a:xfrm>
-            <a:off x="9036416" y="6737506"/>
+            <a:off x="8426816" y="6051706"/>
             <a:ext cx="1645613" cy="1961197"/>
           </a:xfrm>
           <a:prstGeom prst="rect">
@@ -3598,7 +3598,7 @@
         </p:blipFill>
         <p:spPr bwMode="auto">
           <a:xfrm>
-            <a:off x="9029782" y="6737504"/>
+            <a:off x="8420182" y="6051704"/>
             <a:ext cx="351626" cy="329566"/>
           </a:xfrm>
           <a:prstGeom prst="rect">
@@ -3658,7 +3658,7 @@
         </p:blipFill>
         <p:spPr bwMode="auto">
           <a:xfrm>
-            <a:off x="7927483" y="7747837"/>
+            <a:off x="7317883" y="7062037"/>
             <a:ext cx="548640" cy="548640"/>
           </a:xfrm>
           <a:prstGeom prst="rect">
@@ -3705,7 +3705,7 @@
         </p:nvSpPr>
         <p:spPr bwMode="auto">
           <a:xfrm>
-            <a:off x="7295025" y="8262961"/>
+            <a:off x="6685425" y="7577161"/>
             <a:ext cx="1832179" cy="295466"/>
           </a:xfrm>
           <a:prstGeom prst="rect">
@@ -3845,21 +3845,8 @@
                 <a:ea typeface="Amazon Ember" panose="020B0603020204020204" pitchFamily="34" charset="0"/>
                 <a:cs typeface="Arial" panose="020B0604020202020204" pitchFamily="34" charset="0"/>
               </a:rPr>
-              <a:t>AWS </a:t>
+              <a:t>AWS Fargate</a:t>
             </a:r>
-            <a:r>
-              <a:rPr lang="en-US" altLang="en-US" sz="1320" dirty="0">
-                <a:latin typeface="Arial" panose="020B0604020202020204" pitchFamily="34" charset="0"/>
-                <a:ea typeface="Amazon Ember" panose="020B0603020204020204" pitchFamily="34" charset="0"/>
-                <a:cs typeface="Arial" panose="020B0604020202020204" pitchFamily="34" charset="0"/>
-              </a:rPr>
-              <a:t>Fargate</a:t>
-            </a:r>
-            <a:endParaRPr lang="en-US" altLang="en-US" sz="1320" dirty="0">
-              <a:latin typeface="Arial" panose="020B0604020202020204" pitchFamily="34" charset="0"/>
-              <a:ea typeface="Amazon Ember" panose="020B0603020204020204" pitchFamily="34" charset="0"/>
-              <a:cs typeface="Arial" panose="020B0604020202020204" pitchFamily="34" charset="0"/>
-            </a:endParaRPr>
           </a:p>
         </p:txBody>
       </p:sp>
@@ -3892,7 +3879,7 @@
         </p:blipFill>
         <p:spPr bwMode="auto">
           <a:xfrm>
-            <a:off x="12425726" y="4511798"/>
+            <a:off x="11816126" y="3825998"/>
             <a:ext cx="548640" cy="548640"/>
           </a:xfrm>
           <a:prstGeom prst="rect">
@@ -3939,7 +3926,7 @@
         </p:nvSpPr>
         <p:spPr bwMode="auto">
           <a:xfrm>
-            <a:off x="12217493" y="5064002"/>
+            <a:off x="11607893" y="4378202"/>
             <a:ext cx="965107" cy="498598"/>
           </a:xfrm>
           <a:prstGeom prst="rect">
@@ -4123,7 +4110,7 @@
         </p:nvSpPr>
         <p:spPr bwMode="auto">
           <a:xfrm>
-            <a:off x="7764036" y="2983497"/>
+            <a:off x="7154436" y="2297697"/>
             <a:ext cx="1259143" cy="498598"/>
           </a:xfrm>
           <a:prstGeom prst="rect">
@@ -4280,11 +4267,6 @@
               </a:rPr>
               <a:t>event</a:t>
             </a:r>
-            <a:endParaRPr lang="en-US" altLang="en-US" sz="1320" dirty="0">
-              <a:latin typeface="Arial" panose="020B0604020202020204" pitchFamily="34" charset="0"/>
-              <a:ea typeface="Amazon Ember" panose="020B0603020204020204" pitchFamily="34" charset="0"/>
-              <a:cs typeface="Arial" panose="020B0604020202020204" pitchFamily="34" charset="0"/>
-            </a:endParaRPr>
           </a:p>
         </p:txBody>
       </p:sp>
@@ -4317,7 +4299,7 @@
         </p:blipFill>
         <p:spPr bwMode="auto">
           <a:xfrm>
-            <a:off x="8118048" y="2449869"/>
+            <a:off x="7508448" y="1764069"/>
             <a:ext cx="548640" cy="548640"/>
           </a:xfrm>
           <a:prstGeom prst="rect">
@@ -4364,7 +4346,7 @@
         </p:nvSpPr>
         <p:spPr bwMode="auto">
           <a:xfrm>
-            <a:off x="2388871" y="2397002"/>
+            <a:off x="1779271" y="1711202"/>
             <a:ext cx="1475748" cy="498598"/>
           </a:xfrm>
           <a:prstGeom prst="rect">
@@ -4506,11 +4488,6 @@
               </a:rPr>
               <a:t>CloudWatch scheduled event</a:t>
             </a:r>
-            <a:endParaRPr lang="en-US" altLang="en-US" sz="1320" dirty="0">
-              <a:latin typeface="Arial" panose="020B0604020202020204" pitchFamily="34" charset="0"/>
-              <a:ea typeface="Amazon Ember" panose="020B0603020204020204" pitchFamily="34" charset="0"/>
-              <a:cs typeface="Arial" panose="020B0604020202020204" pitchFamily="34" charset="0"/>
-            </a:endParaRPr>
           </a:p>
         </p:txBody>
       </p:sp>
@@ -4543,7 +4520,7 @@
         </p:blipFill>
         <p:spPr bwMode="auto">
           <a:xfrm>
-            <a:off x="2848854" y="1880518"/>
+            <a:off x="2239254" y="1194718"/>
             <a:ext cx="548640" cy="548640"/>
           </a:xfrm>
           <a:prstGeom prst="rect">
@@ -4590,7 +4567,7 @@
         </p:nvSpPr>
         <p:spPr bwMode="auto">
           <a:xfrm>
-            <a:off x="1962625" y="4223285"/>
+            <a:off x="1353025" y="3537485"/>
             <a:ext cx="1244131" cy="295466"/>
           </a:xfrm>
           <a:prstGeom prst="rect">
@@ -4732,11 +4709,6 @@
               </a:rPr>
               <a:t>CodePipeline</a:t>
             </a:r>
-            <a:endParaRPr lang="en-US" altLang="en-US" sz="1320" dirty="0">
-              <a:latin typeface="Arial" panose="020B0604020202020204" pitchFamily="34" charset="0"/>
-              <a:ea typeface="Amazon Ember" panose="020B0603020204020204" pitchFamily="34" charset="0"/>
-              <a:cs typeface="Arial" panose="020B0604020202020204" pitchFamily="34" charset="0"/>
-            </a:endParaRPr>
           </a:p>
         </p:txBody>
       </p:sp>
@@ -4769,7 +4741,7 @@
         </p:blipFill>
         <p:spPr bwMode="auto">
           <a:xfrm>
-            <a:off x="3467693" y="3677863"/>
+            <a:off x="2858093" y="2992063"/>
             <a:ext cx="548640" cy="548640"/>
           </a:xfrm>
           <a:prstGeom prst="rect">
@@ -4816,7 +4788,7 @@
         </p:nvSpPr>
         <p:spPr bwMode="auto">
           <a:xfrm>
-            <a:off x="3100508" y="4223285"/>
+            <a:off x="2490908" y="3537485"/>
             <a:ext cx="1254325" cy="295466"/>
           </a:xfrm>
           <a:prstGeom prst="rect">
@@ -4958,11 +4930,6 @@
               </a:rPr>
               <a:t>CodeCommit</a:t>
             </a:r>
-            <a:endParaRPr lang="en-US" altLang="en-US" sz="1320" dirty="0">
-              <a:latin typeface="Arial" panose="020B0604020202020204" pitchFamily="34" charset="0"/>
-              <a:ea typeface="Amazon Ember" panose="020B0603020204020204" pitchFamily="34" charset="0"/>
-              <a:cs typeface="Arial" panose="020B0604020202020204" pitchFamily="34" charset="0"/>
-            </a:endParaRPr>
           </a:p>
         </p:txBody>
       </p:sp>
@@ -4995,7 +4962,7 @@
         </p:blipFill>
         <p:spPr bwMode="auto">
           <a:xfrm>
-            <a:off x="2311645" y="4857187"/>
+            <a:off x="1702045" y="4171387"/>
             <a:ext cx="548640" cy="548640"/>
           </a:xfrm>
           <a:prstGeom prst="rect">
@@ -5042,7 +5009,7 @@
         </p:nvSpPr>
         <p:spPr bwMode="auto">
           <a:xfrm>
-            <a:off x="2029170" y="5400573"/>
+            <a:off x="1419570" y="4714773"/>
             <a:ext cx="1113592" cy="295466"/>
           </a:xfrm>
           <a:prstGeom prst="rect">
@@ -5184,11 +5151,6 @@
               </a:rPr>
               <a:t>CodeBuild</a:t>
             </a:r>
-            <a:endParaRPr lang="en-US" altLang="en-US" sz="1320" dirty="0">
-              <a:latin typeface="Arial" panose="020B0604020202020204" pitchFamily="34" charset="0"/>
-              <a:ea typeface="Amazon Ember" panose="020B0603020204020204" pitchFamily="34" charset="0"/>
-              <a:cs typeface="Arial" panose="020B0604020202020204" pitchFamily="34" charset="0"/>
-            </a:endParaRPr>
           </a:p>
         </p:txBody>
       </p:sp>
@@ -5221,7 +5183,7 @@
         </p:blipFill>
         <p:spPr bwMode="auto">
           <a:xfrm>
-            <a:off x="5885051" y="2449869"/>
+            <a:off x="5275451" y="1764069"/>
             <a:ext cx="548640" cy="548640"/>
           </a:xfrm>
           <a:prstGeom prst="rect">
@@ -5268,7 +5230,7 @@
         </p:nvSpPr>
         <p:spPr bwMode="auto">
           <a:xfrm>
-            <a:off x="5462526" y="2983497"/>
+            <a:off x="4852926" y="2297697"/>
             <a:ext cx="1416968" cy="498598"/>
           </a:xfrm>
           <a:prstGeom prst="rect">
@@ -5409,14 +5371,6 @@
                 <a:cs typeface="Arial" panose="020B0604020202020204" pitchFamily="34" charset="0"/>
               </a:rPr>
               <a:t>AWS Secrets </a:t>
-            </a:r>
-            <a:r>
-              <a:rPr lang="en-US" altLang="en-US" sz="1320" dirty="0">
-                <a:latin typeface="Arial" panose="020B0604020202020204" pitchFamily="34" charset="0"/>
-                <a:ea typeface="Amazon Ember" panose="020B0603020204020204" pitchFamily="34" charset="0"/>
-                <a:cs typeface="Arial" panose="020B0604020202020204" pitchFamily="34" charset="0"/>
-              </a:rPr>
-              <a:t/>
             </a:r>
             <a:br>
               <a:rPr lang="en-US" altLang="en-US" sz="1320" dirty="0">
@@ -5433,11 +5387,6 @@
               </a:rPr>
               <a:t>Manager</a:t>
             </a:r>
-            <a:endParaRPr lang="en-US" altLang="en-US" sz="1320" dirty="0">
-              <a:latin typeface="Arial" panose="020B0604020202020204" pitchFamily="34" charset="0"/>
-              <a:ea typeface="Amazon Ember" panose="020B0603020204020204" pitchFamily="34" charset="0"/>
-              <a:cs typeface="Arial" panose="020B0604020202020204" pitchFamily="34" charset="0"/>
-            </a:endParaRPr>
           </a:p>
         </p:txBody>
       </p:sp>
@@ -5470,7 +5419,7 @@
         </p:blipFill>
         <p:spPr bwMode="auto">
           <a:xfrm>
-            <a:off x="2311645" y="7757386"/>
+            <a:off x="1702045" y="7071586"/>
             <a:ext cx="548640" cy="548640"/>
           </a:xfrm>
           <a:prstGeom prst="rect">
@@ -5517,7 +5466,7 @@
         </p:nvSpPr>
         <p:spPr bwMode="auto">
           <a:xfrm>
-            <a:off x="1848326" y="8305975"/>
+            <a:off x="1238726" y="7620175"/>
             <a:ext cx="1489366" cy="295466"/>
           </a:xfrm>
           <a:prstGeom prst="rect">
@@ -5691,7 +5640,7 @@
         </p:blipFill>
         <p:spPr bwMode="auto">
           <a:xfrm>
-            <a:off x="12982215" y="6477000"/>
+            <a:off x="12715042" y="5572648"/>
             <a:ext cx="548640" cy="548640"/>
           </a:xfrm>
           <a:prstGeom prst="rect">
@@ -5738,7 +5687,7 @@
         </p:nvSpPr>
         <p:spPr bwMode="auto">
           <a:xfrm>
-            <a:off x="12730396" y="7048595"/>
+            <a:off x="12463223" y="6144243"/>
             <a:ext cx="1052279" cy="295466"/>
           </a:xfrm>
           <a:prstGeom prst="rect">
@@ -5899,7 +5848,7 @@
         </p:nvSpPr>
         <p:spPr bwMode="auto">
           <a:xfrm>
-            <a:off x="11212204" y="2983497"/>
+            <a:off x="10602604" y="2297697"/>
             <a:ext cx="1624764" cy="498598"/>
           </a:xfrm>
           <a:prstGeom prst="rect">
@@ -6040,14 +5989,6 @@
                 <a:cs typeface="Arial" panose="020B0604020202020204" pitchFamily="34" charset="0"/>
               </a:rPr>
               <a:t>CloudWatch</a:t>
-            </a:r>
-            <a:r>
-              <a:rPr lang="en-US" altLang="en-US" sz="1320" dirty="0">
-                <a:latin typeface="Arial" panose="020B0604020202020204" pitchFamily="34" charset="0"/>
-                <a:ea typeface="Amazon Ember" panose="020B0603020204020204" pitchFamily="34" charset="0"/>
-                <a:cs typeface="Arial" panose="020B0604020202020204" pitchFamily="34" charset="0"/>
-              </a:rPr>
-              <a:t/>
             </a:r>
             <a:br>
               <a:rPr lang="en-US" altLang="en-US" sz="1320" dirty="0">
@@ -6064,11 +6005,6 @@
               </a:rPr>
               <a:t>event</a:t>
             </a:r>
-            <a:endParaRPr lang="en-US" altLang="en-US" sz="1320" dirty="0">
-              <a:latin typeface="Arial" panose="020B0604020202020204" pitchFamily="34" charset="0"/>
-              <a:ea typeface="Amazon Ember" panose="020B0603020204020204" pitchFamily="34" charset="0"/>
-              <a:cs typeface="Arial" panose="020B0604020202020204" pitchFamily="34" charset="0"/>
-            </a:endParaRPr>
           </a:p>
         </p:txBody>
       </p:sp>
@@ -6101,7 +6037,7 @@
         </p:blipFill>
         <p:spPr bwMode="auto">
           <a:xfrm>
-            <a:off x="11750947" y="2449869"/>
+            <a:off x="11141347" y="1764069"/>
             <a:ext cx="548640" cy="548640"/>
           </a:xfrm>
           <a:prstGeom prst="rect">
@@ -6148,7 +6084,7 @@
         </p:nvSpPr>
         <p:spPr bwMode="auto">
           <a:xfrm>
-            <a:off x="9737902" y="2983497"/>
+            <a:off x="9128302" y="2297697"/>
             <a:ext cx="2001352" cy="498598"/>
           </a:xfrm>
           <a:prstGeom prst="rect">
@@ -6288,15 +6224,7 @@
                 <a:ea typeface="Amazon Ember" panose="020B0603020204020204" pitchFamily="34" charset="0"/>
                 <a:cs typeface="Arial" panose="020B0604020202020204" pitchFamily="34" charset="0"/>
               </a:rPr>
-              <a:t>Systems </a:t>
-            </a:r>
-            <a:r>
-              <a:rPr lang="en-US" altLang="en-US" sz="1320" dirty="0">
-                <a:latin typeface="Arial" panose="020B0604020202020204" pitchFamily="34" charset="0"/>
-                <a:ea typeface="Amazon Ember" panose="020B0603020204020204" pitchFamily="34" charset="0"/>
-                <a:cs typeface="Arial" panose="020B0604020202020204" pitchFamily="34" charset="0"/>
-              </a:rPr>
-              <a:t>Manager</a:t>
+              <a:t>Systems Manager</a:t>
             </a:r>
           </a:p>
           <a:p>
@@ -6307,29 +6235,8 @@
                 <a:ea typeface="Amazon Ember" panose="020B0603020204020204" pitchFamily="34" charset="0"/>
                 <a:cs typeface="Arial" panose="020B0604020202020204" pitchFamily="34" charset="0"/>
               </a:rPr>
-              <a:t>Parameter </a:t>
+              <a:t>Parameter Store</a:t>
             </a:r>
-            <a:r>
-              <a:rPr lang="en-US" altLang="en-US" sz="1320" dirty="0">
-                <a:latin typeface="Arial" panose="020B0604020202020204" pitchFamily="34" charset="0"/>
-                <a:ea typeface="Amazon Ember" panose="020B0603020204020204" pitchFamily="34" charset="0"/>
-                <a:cs typeface="Arial" panose="020B0604020202020204" pitchFamily="34" charset="0"/>
-              </a:rPr>
-              <a:t>S</a:t>
-            </a:r>
-            <a:r>
-              <a:rPr lang="en-US" altLang="en-US" sz="1320" dirty="0">
-                <a:latin typeface="Arial" panose="020B0604020202020204" pitchFamily="34" charset="0"/>
-                <a:ea typeface="Amazon Ember" panose="020B0603020204020204" pitchFamily="34" charset="0"/>
-                <a:cs typeface="Arial" panose="020B0604020202020204" pitchFamily="34" charset="0"/>
-              </a:rPr>
-              <a:t>tore</a:t>
-            </a:r>
-            <a:endParaRPr lang="en-US" altLang="en-US" sz="1320" dirty="0">
-              <a:latin typeface="Arial" panose="020B0604020202020204" pitchFamily="34" charset="0"/>
-              <a:ea typeface="Amazon Ember" panose="020B0603020204020204" pitchFamily="34" charset="0"/>
-              <a:cs typeface="Arial" panose="020B0604020202020204" pitchFamily="34" charset="0"/>
-            </a:endParaRPr>
           </a:p>
         </p:txBody>
       </p:sp>
@@ -6362,7 +6269,7 @@
         </p:blipFill>
         <p:spPr bwMode="auto">
           <a:xfrm>
-            <a:off x="10468120" y="2449869"/>
+            <a:off x="9858520" y="1764069"/>
             <a:ext cx="548640" cy="548640"/>
           </a:xfrm>
           <a:prstGeom prst="rect">
@@ -6409,7 +6316,7 @@
         </p:nvSpPr>
         <p:spPr bwMode="auto">
           <a:xfrm>
-            <a:off x="6474525" y="2983500"/>
+            <a:off x="5864925" y="2297700"/>
             <a:ext cx="1515378" cy="904863"/>
           </a:xfrm>
           <a:prstGeom prst="rect">
@@ -6574,12 +6481,20 @@
               </a:rPr>
             </a:br>
             <a:r>
+              <a:rPr lang="en-US" altLang="en-US" sz="1320" dirty="0" smtClean="0">
+                <a:latin typeface="Arial" panose="020B0604020202020204" pitchFamily="34" charset="0"/>
+                <a:ea typeface="Amazon Ember" panose="020B0603020204020204" pitchFamily="34" charset="0"/>
+                <a:cs typeface="Arial" panose="020B0604020202020204" pitchFamily="34" charset="0"/>
+              </a:rPr>
+              <a:t>Rebuild</a:t>
+            </a:r>
+            <a:r>
               <a:rPr lang="en-US" altLang="en-US" sz="1320" dirty="0">
                 <a:latin typeface="Arial" panose="020B0604020202020204" pitchFamily="34" charset="0"/>
                 <a:ea typeface="Amazon Ember" panose="020B0603020204020204" pitchFamily="34" charset="0"/>
                 <a:cs typeface="Arial" panose="020B0604020202020204" pitchFamily="34" charset="0"/>
               </a:rPr>
-              <a:t>Replace</a:t>
+              <a:t/>
             </a:r>
             <a:br>
               <a:rPr lang="en-US" altLang="en-US" sz="1320" dirty="0">
@@ -6596,11 +6511,6 @@
               </a:rPr>
               <a:t>containers</a:t>
             </a:r>
-            <a:endParaRPr lang="en-US" altLang="en-US" sz="1320" dirty="0">
-              <a:latin typeface="Arial" panose="020B0604020202020204" pitchFamily="34" charset="0"/>
-              <a:ea typeface="Amazon Ember" panose="020B0603020204020204" pitchFamily="34" charset="0"/>
-              <a:cs typeface="Arial" panose="020B0604020202020204" pitchFamily="34" charset="0"/>
-            </a:endParaRPr>
           </a:p>
         </p:txBody>
       </p:sp>
@@ -6620,7 +6530,7 @@
         </p:nvSpPr>
         <p:spPr bwMode="auto">
           <a:xfrm>
-            <a:off x="8869689" y="2983498"/>
+            <a:off x="8260089" y="2297698"/>
             <a:ext cx="1258520" cy="904863"/>
           </a:xfrm>
           <a:prstGeom prst="rect">
@@ -6777,11 +6687,6 @@
               </a:rPr>
               <a:t>Update Duo MFA settings</a:t>
             </a:r>
-            <a:endParaRPr lang="en-US" altLang="en-US" sz="1320" dirty="0">
-              <a:latin typeface="Arial" panose="020B0604020202020204" pitchFamily="34" charset="0"/>
-              <a:ea typeface="Amazon Ember" panose="020B0603020204020204" pitchFamily="34" charset="0"/>
-              <a:cs typeface="Arial" panose="020B0604020202020204" pitchFamily="34" charset="0"/>
-            </a:endParaRPr>
           </a:p>
         </p:txBody>
       </p:sp>
@@ -6801,7 +6706,7 @@
         </p:nvSpPr>
         <p:spPr bwMode="auto">
           <a:xfrm>
-            <a:off x="12442703" y="2983498"/>
+            <a:off x="11833103" y="2297698"/>
             <a:ext cx="1425697" cy="904863"/>
           </a:xfrm>
           <a:prstGeom prst="rect">
@@ -6973,11 +6878,6 @@
               </a:rPr>
               <a:t>notify</a:t>
             </a:r>
-            <a:endParaRPr lang="en-US" altLang="en-US" sz="1320" dirty="0">
-              <a:latin typeface="Arial" panose="020B0604020202020204" pitchFamily="34" charset="0"/>
-              <a:ea typeface="Amazon Ember" panose="020B0603020204020204" pitchFamily="34" charset="0"/>
-              <a:cs typeface="Arial" panose="020B0604020202020204" pitchFamily="34" charset="0"/>
-            </a:endParaRPr>
           </a:p>
         </p:txBody>
       </p:sp>
@@ -7010,7 +6910,7 @@
         </p:blipFill>
         <p:spPr bwMode="auto">
           <a:xfrm>
-            <a:off x="2311645" y="3683483"/>
+            <a:off x="1702045" y="2997683"/>
             <a:ext cx="548640" cy="548640"/>
           </a:xfrm>
           <a:prstGeom prst="rect">
@@ -7059,7 +6959,7 @@
         </p:nvCxnSpPr>
         <p:spPr>
           <a:xfrm rot="5400000" flipH="1" flipV="1">
-            <a:off x="2462414" y="3019152"/>
+            <a:off x="1852814" y="2333352"/>
             <a:ext cx="787883" cy="540780"/>
           </a:xfrm>
           <a:prstGeom prst="bentConnector3">
@@ -7108,7 +7008,7 @@
         </p:nvCxnSpPr>
         <p:spPr>
           <a:xfrm flipV="1">
-            <a:off x="2585965" y="6964770"/>
+            <a:off x="1976365" y="6278970"/>
             <a:ext cx="4" cy="792617"/>
           </a:xfrm>
           <a:prstGeom prst="straightConnector1">
@@ -7155,7 +7055,7 @@
         </p:nvCxnSpPr>
         <p:spPr>
           <a:xfrm flipV="1">
-            <a:off x="4420500" y="8022157"/>
+            <a:off x="3810900" y="7336357"/>
             <a:ext cx="3506983" cy="9549"/>
           </a:xfrm>
           <a:prstGeom prst="straightConnector1">
@@ -7202,7 +7102,7 @@
         </p:nvCxnSpPr>
         <p:spPr>
           <a:xfrm flipH="1">
-            <a:off x="6433693" y="2722812"/>
+            <a:off x="5824093" y="2037012"/>
             <a:ext cx="516666" cy="1378"/>
           </a:xfrm>
           <a:prstGeom prst="straightConnector1">
@@ -7249,7 +7149,7 @@
         </p:nvCxnSpPr>
         <p:spPr>
           <a:xfrm flipH="1">
-            <a:off x="8666691" y="2722812"/>
+            <a:off x="8057091" y="2037012"/>
             <a:ext cx="583136" cy="1378"/>
           </a:xfrm>
           <a:prstGeom prst="straightConnector1">
@@ -7296,7 +7196,7 @@
         </p:nvCxnSpPr>
         <p:spPr>
           <a:xfrm flipH="1" flipV="1">
-            <a:off x="9798466" y="2722812"/>
+            <a:off x="9188866" y="2037012"/>
             <a:ext cx="669655" cy="1378"/>
           </a:xfrm>
           <a:prstGeom prst="straightConnector1">
@@ -7343,7 +7243,7 @@
         </p:nvCxnSpPr>
         <p:spPr>
           <a:xfrm flipH="1">
-            <a:off x="11016763" y="2724189"/>
+            <a:off x="10407163" y="2038389"/>
             <a:ext cx="734188" cy="0"/>
           </a:xfrm>
           <a:prstGeom prst="straightConnector1">
@@ -7390,7 +7290,7 @@
         </p:nvCxnSpPr>
         <p:spPr>
           <a:xfrm flipH="1" flipV="1">
-            <a:off x="12299587" y="2724189"/>
+            <a:off x="11689987" y="2038389"/>
             <a:ext cx="581644" cy="1745"/>
           </a:xfrm>
           <a:prstGeom prst="straightConnector1">
@@ -7433,7 +7333,7 @@
         </p:nvSpPr>
         <p:spPr>
           <a:xfrm>
-            <a:off x="5813723" y="5190604"/>
+            <a:off x="5204123" y="4504804"/>
             <a:ext cx="1613202" cy="1456496"/>
           </a:xfrm>
           <a:prstGeom prst="rect">
@@ -7482,13 +7382,6 @@
               </a:rPr>
               <a:t>Public subnet</a:t>
             </a:r>
-            <a:endParaRPr lang="en-US" sz="1320" dirty="0">
-              <a:solidFill>
-                <a:srgbClr val="1E8900"/>
-              </a:solidFill>
-              <a:latin typeface="Arial" panose="020B0604020202020204" pitchFamily="34" charset="0"/>
-              <a:cs typeface="Arial" panose="020B0604020202020204" pitchFamily="34" charset="0"/>
-            </a:endParaRPr>
           </a:p>
         </p:txBody>
       </p:sp>
@@ -7521,7 +7414,7 @@
         </p:blipFill>
         <p:spPr bwMode="auto">
           <a:xfrm>
-            <a:off x="5813724" y="5190602"/>
+            <a:off x="5204124" y="4504802"/>
             <a:ext cx="329566" cy="329566"/>
           </a:xfrm>
           <a:prstGeom prst="rect">
@@ -7566,7 +7459,7 @@
         </p:nvSpPr>
         <p:spPr>
           <a:xfrm>
-            <a:off x="9029782" y="5190604"/>
+            <a:off x="8420182" y="4504804"/>
             <a:ext cx="1652248" cy="1456496"/>
           </a:xfrm>
           <a:prstGeom prst="rect">
@@ -7647,7 +7540,7 @@
         </p:blipFill>
         <p:spPr bwMode="auto">
           <a:xfrm>
-            <a:off x="9026910" y="5190602"/>
+            <a:off x="8417310" y="4504802"/>
             <a:ext cx="329566" cy="329566"/>
           </a:xfrm>
           <a:prstGeom prst="rect">
@@ -7694,7 +7587,7 @@
         </p:nvSpPr>
         <p:spPr bwMode="auto">
           <a:xfrm>
-            <a:off x="5974497" y="6251055"/>
+            <a:off x="5364897" y="5565255"/>
             <a:ext cx="1312936" cy="295466"/>
           </a:xfrm>
           <a:prstGeom prst="rect">
@@ -7836,11 +7729,6 @@
               </a:rPr>
               <a:t>NAT gateway</a:t>
             </a:r>
-            <a:endParaRPr lang="en-US" altLang="en-US" sz="1320" dirty="0">
-              <a:latin typeface="Arial" panose="020B0604020202020204" pitchFamily="34" charset="0"/>
-              <a:ea typeface="Amazon Ember" panose="020B0603020204020204" pitchFamily="34" charset="0"/>
-              <a:cs typeface="Arial" panose="020B0604020202020204" pitchFamily="34" charset="0"/>
-            </a:endParaRPr>
           </a:p>
         </p:txBody>
       </p:sp>
@@ -7873,7 +7761,7 @@
         </p:blipFill>
         <p:spPr bwMode="auto">
           <a:xfrm>
-            <a:off x="6340351" y="5657779"/>
+            <a:off x="5730751" y="4971979"/>
             <a:ext cx="548640" cy="548640"/>
           </a:xfrm>
           <a:prstGeom prst="rect">
@@ -7922,8 +7810,8 @@
         </p:nvCxnSpPr>
         <p:spPr>
           <a:xfrm rot="16200000" flipV="1">
-            <a:off x="13060985" y="3982929"/>
-            <a:ext cx="627663" cy="438528"/>
+            <a:off x="12453826" y="3294688"/>
+            <a:ext cx="627663" cy="443410"/>
           </a:xfrm>
           <a:prstGeom prst="bentConnector3">
             <a:avLst>
@@ -7969,7 +7857,7 @@
         </p:nvSpPr>
         <p:spPr bwMode="auto">
           <a:xfrm>
-            <a:off x="10944792" y="8332365"/>
+            <a:off x="10435673" y="7646565"/>
             <a:ext cx="2043517" cy="498598"/>
           </a:xfrm>
           <a:prstGeom prst="rect">
@@ -8109,7 +7997,7 @@
                 <a:ea typeface="Amazon Ember" panose="020B0603020204020204" pitchFamily="34" charset="0"/>
                 <a:cs typeface="Arial" panose="020B0604020202020204" pitchFamily="34" charset="0"/>
               </a:rPr>
-              <a:t>CloudWatch</a:t>
+              <a:t>CloudWatch </a:t>
             </a:r>
             <a:r>
               <a:rPr lang="en-US" altLang="en-US" sz="1320" dirty="0">
@@ -8117,7 +8005,7 @@
                 <a:ea typeface="Amazon Ember" panose="020B0603020204020204" pitchFamily="34" charset="0"/>
                 <a:cs typeface="Arial" panose="020B0604020202020204" pitchFamily="34" charset="0"/>
               </a:rPr>
-              <a:t> </a:t>
+              <a:t>alarms</a:t>
             </a:r>
             <a:r>
               <a:rPr lang="en-US" altLang="en-US" sz="1320" dirty="0">
@@ -8135,12 +8023,12 @@
               </a:rPr>
             </a:br>
             <a:r>
-              <a:rPr lang="en-US" altLang="en-US" sz="1320" dirty="0">
+              <a:rPr lang="en-US" altLang="en-US" sz="1320" dirty="0" smtClean="0">
                 <a:latin typeface="Arial" panose="020B0604020202020204" pitchFamily="34" charset="0"/>
                 <a:ea typeface="Amazon Ember" panose="020B0603020204020204" pitchFamily="34" charset="0"/>
                 <a:cs typeface="Arial" panose="020B0604020202020204" pitchFamily="34" charset="0"/>
               </a:rPr>
-              <a:t>CPU </a:t>
+              <a:t>for CPU </a:t>
             </a:r>
             <a:r>
               <a:rPr lang="en-US" altLang="en-US" sz="1320" dirty="0">
@@ -8151,12 +8039,12 @@
               <a:t>&amp; </a:t>
             </a:r>
             <a:r>
-              <a:rPr lang="en-US" altLang="en-US" sz="1320" dirty="0">
+              <a:rPr lang="en-US" altLang="en-US" sz="1320" dirty="0" smtClean="0">
                 <a:latin typeface="Arial" panose="020B0604020202020204" pitchFamily="34" charset="0"/>
                 <a:ea typeface="Amazon Ember" panose="020B0603020204020204" pitchFamily="34" charset="0"/>
                 <a:cs typeface="Arial" panose="020B0604020202020204" pitchFamily="34" charset="0"/>
               </a:rPr>
-              <a:t>memory alarms</a:t>
+              <a:t>memory</a:t>
             </a:r>
             <a:endParaRPr lang="en-US" altLang="en-US" sz="1320" dirty="0">
               <a:latin typeface="Arial" panose="020B0604020202020204" pitchFamily="34" charset="0"/>
@@ -8195,7 +8083,7 @@
         </p:blipFill>
         <p:spPr bwMode="auto">
           <a:xfrm>
-            <a:off x="11685998" y="7757386"/>
+            <a:off x="11176879" y="7071586"/>
             <a:ext cx="548640" cy="548640"/>
           </a:xfrm>
           <a:prstGeom prst="rect">
@@ -8237,13 +8125,14 @@
           </p:cNvPr>
           <p:cNvCxnSpPr>
             <a:cxnSpLocks/>
+            <a:stCxn id="92" idx="1"/>
           </p:cNvCxnSpPr>
           <p:nvPr/>
         </p:nvCxnSpPr>
         <p:spPr>
           <a:xfrm flipH="1">
-            <a:off x="8476124" y="8031706"/>
-            <a:ext cx="3065098" cy="0"/>
+            <a:off x="7866524" y="7345906"/>
+            <a:ext cx="3310355" cy="0"/>
           </a:xfrm>
           <a:prstGeom prst="straightConnector1">
             <a:avLst/>
@@ -8289,8 +8178,8 @@
         </p:nvCxnSpPr>
         <p:spPr>
           <a:xfrm flipV="1">
-            <a:off x="12234638" y="8028026"/>
-            <a:ext cx="757102" cy="3680"/>
+            <a:off x="11725519" y="7342226"/>
+            <a:ext cx="989523" cy="3680"/>
           </a:xfrm>
           <a:prstGeom prst="straightConnector1">
             <a:avLst/>
@@ -8335,7 +8224,7 @@
         </p:nvCxnSpPr>
         <p:spPr>
           <a:xfrm flipV="1">
-            <a:off x="8393608" y="3482095"/>
+            <a:off x="7784008" y="2796295"/>
             <a:ext cx="0" cy="4265742"/>
           </a:xfrm>
           <a:prstGeom prst="straightConnector1">
@@ -8382,7 +8271,7 @@
         </p:nvCxnSpPr>
         <p:spPr>
           <a:xfrm rot="5400000" flipH="1" flipV="1">
-            <a:off x="12616081" y="3972327"/>
+            <a:off x="12006481" y="3286527"/>
             <a:ext cx="623437" cy="455506"/>
           </a:xfrm>
           <a:prstGeom prst="bentConnector3">
@@ -8442,7 +8331,7 @@
         </p:blipFill>
         <p:spPr bwMode="auto">
           <a:xfrm>
-            <a:off x="6950357" y="2448491"/>
+            <a:off x="6340757" y="1762691"/>
             <a:ext cx="548640" cy="548640"/>
           </a:xfrm>
           <a:prstGeom prst="rect">
@@ -8502,7 +8391,7 @@
         </p:blipFill>
         <p:spPr bwMode="auto">
           <a:xfrm>
-            <a:off x="9249825" y="2448491"/>
+            <a:off x="8640225" y="1762691"/>
             <a:ext cx="548640" cy="548640"/>
           </a:xfrm>
           <a:prstGeom prst="rect">
@@ -8562,7 +8451,7 @@
         </p:blipFill>
         <p:spPr bwMode="auto">
           <a:xfrm>
-            <a:off x="12881231" y="2451614"/>
+            <a:off x="12271631" y="1765814"/>
             <a:ext cx="548640" cy="548640"/>
           </a:xfrm>
           <a:prstGeom prst="rect">
@@ -8607,7 +8496,7 @@
         </p:nvSpPr>
         <p:spPr>
           <a:xfrm>
-            <a:off x="5563712" y="1905000"/>
+            <a:off x="4954112" y="1219200"/>
             <a:ext cx="8459613" cy="2131422"/>
           </a:xfrm>
           <a:prstGeom prst="rect">
@@ -8654,13 +8543,6 @@
               </a:rPr>
               <a:t>Secrets and events management</a:t>
             </a:r>
-            <a:endParaRPr lang="en-US" sz="1320" dirty="0">
-              <a:solidFill>
-                <a:srgbClr val="5A6B86"/>
-              </a:solidFill>
-              <a:latin typeface="Arial" panose="020B0604020202020204" pitchFamily="34" charset="0"/>
-              <a:cs typeface="Arial" panose="020B0604020202020204" pitchFamily="34" charset="0"/>
-            </a:endParaRPr>
           </a:p>
         </p:txBody>
       </p:sp>
@@ -8680,8 +8562,8 @@
         </p:nvSpPr>
         <p:spPr bwMode="auto">
           <a:xfrm>
-            <a:off x="12751057" y="8333459"/>
-            <a:ext cx="1030007" cy="295466"/>
+            <a:off x="12474359" y="7647659"/>
+            <a:ext cx="1030007" cy="498598"/>
           </a:xfrm>
           <a:prstGeom prst="rect">
             <a:avLst/>
@@ -8847,7 +8729,7 @@
                 <a:ea typeface="Amazon Ember" panose="020B0603020204020204" pitchFamily="34" charset="0"/>
                 <a:cs typeface="Arial" panose="020B0604020202020204" pitchFamily="34" charset="0"/>
               </a:rPr>
-              <a:t>SNS topic</a:t>
+              <a:t>SNS notification</a:t>
             </a:r>
             <a:endParaRPr lang="en-US" altLang="en-US" sz="1320" dirty="0">
               <a:latin typeface="Arial" panose="020B0604020202020204" pitchFamily="34" charset="0"/>
@@ -8886,7 +8768,7 @@
         </p:blipFill>
         <p:spPr bwMode="auto">
           <a:xfrm>
-            <a:off x="12991740" y="7753706"/>
+            <a:off x="12715042" y="7067906"/>
             <a:ext cx="548640" cy="548640"/>
           </a:xfrm>
           <a:prstGeom prst="rect">
@@ -8933,8 +8815,8 @@
         </p:nvSpPr>
         <p:spPr bwMode="auto">
           <a:xfrm>
-            <a:off x="13087784" y="5087190"/>
-            <a:ext cx="957315" cy="295466"/>
+            <a:off x="12446654" y="4401390"/>
+            <a:ext cx="1085416" cy="498598"/>
           </a:xfrm>
           <a:prstGeom prst="rect">
             <a:avLst/>
@@ -9100,7 +8982,15 @@
                 <a:ea typeface="Amazon Ember" panose="020B0603020204020204" pitchFamily="34" charset="0"/>
                 <a:cs typeface="Arial" panose="020B0604020202020204" pitchFamily="34" charset="0"/>
               </a:rPr>
-              <a:t>SNS topic</a:t>
+              <a:t>SNS </a:t>
+            </a:r>
+            <a:r>
+              <a:rPr lang="en-US" altLang="en-US" sz="1320" dirty="0" smtClean="0">
+                <a:latin typeface="Arial" panose="020B0604020202020204" pitchFamily="34" charset="0"/>
+                <a:ea typeface="Amazon Ember" panose="020B0603020204020204" pitchFamily="34" charset="0"/>
+                <a:cs typeface="Arial" panose="020B0604020202020204" pitchFamily="34" charset="0"/>
+              </a:rPr>
+              <a:t>notification</a:t>
             </a:r>
             <a:endParaRPr lang="en-US" altLang="en-US" sz="1320" dirty="0">
               <a:latin typeface="Arial" panose="020B0604020202020204" pitchFamily="34" charset="0"/>
@@ -9139,7 +9029,7 @@
         </p:blipFill>
         <p:spPr bwMode="auto">
           <a:xfrm>
-            <a:off x="13319760" y="4516024"/>
+            <a:off x="12715042" y="3830224"/>
             <a:ext cx="548640" cy="548640"/>
           </a:xfrm>
           <a:prstGeom prst="rect">
@@ -9186,7 +9076,7 @@
         </p:nvSpPr>
         <p:spPr bwMode="auto">
           <a:xfrm>
-            <a:off x="9196204" y="6243863"/>
+            <a:off x="8586604" y="5558063"/>
             <a:ext cx="1312936" cy="295466"/>
           </a:xfrm>
           <a:prstGeom prst="rect">
@@ -9326,21 +9216,8 @@
                 <a:ea typeface="Amazon Ember" panose="020B0603020204020204" pitchFamily="34" charset="0"/>
                 <a:cs typeface="Arial" panose="020B0604020202020204" pitchFamily="34" charset="0"/>
               </a:rPr>
-              <a:t>NAT </a:t>
+              <a:t>NAT gateway</a:t>
             </a:r>
-            <a:r>
-              <a:rPr lang="en-US" altLang="en-US" sz="1320" dirty="0">
-                <a:latin typeface="Arial" panose="020B0604020202020204" pitchFamily="34" charset="0"/>
-                <a:ea typeface="Amazon Ember" panose="020B0603020204020204" pitchFamily="34" charset="0"/>
-                <a:cs typeface="Arial" panose="020B0604020202020204" pitchFamily="34" charset="0"/>
-              </a:rPr>
-              <a:t>gateway</a:t>
-            </a:r>
-            <a:endParaRPr lang="en-US" altLang="en-US" sz="1320" dirty="0">
-              <a:latin typeface="Arial" panose="020B0604020202020204" pitchFamily="34" charset="0"/>
-              <a:ea typeface="Amazon Ember" panose="020B0603020204020204" pitchFamily="34" charset="0"/>
-              <a:cs typeface="Arial" panose="020B0604020202020204" pitchFamily="34" charset="0"/>
-            </a:endParaRPr>
           </a:p>
         </p:txBody>
       </p:sp>
@@ -9373,7 +9250,7 @@
         </p:blipFill>
         <p:spPr bwMode="auto">
           <a:xfrm>
-            <a:off x="9562058" y="5650586"/>
+            <a:off x="8952458" y="4964786"/>
             <a:ext cx="548640" cy="548640"/>
           </a:xfrm>
           <a:prstGeom prst="rect">
@@ -9412,7 +9289,7 @@
         </p:nvSpPr>
         <p:spPr>
           <a:xfrm>
-            <a:off x="2229350" y="3194661"/>
+            <a:off x="1619750" y="2508861"/>
             <a:ext cx="1823969" cy="262914"/>
           </a:xfrm>
           <a:prstGeom prst="rect">
@@ -9464,7 +9341,7 @@
         </p:nvSpPr>
         <p:spPr>
           <a:xfrm>
-            <a:off x="1983058" y="3119873"/>
+            <a:off x="1373458" y="2434073"/>
             <a:ext cx="2302620" cy="3947198"/>
           </a:xfrm>
           <a:prstGeom prst="rect">
@@ -9511,13 +9388,6 @@
               </a:rPr>
               <a:t>Image deployment</a:t>
             </a:r>
-            <a:endParaRPr lang="en-US" sz="1320" dirty="0">
-              <a:solidFill>
-                <a:srgbClr val="5A6B86"/>
-              </a:solidFill>
-              <a:latin typeface="Arial" panose="020B0604020202020204" pitchFamily="34" charset="0"/>
-              <a:cs typeface="Arial" panose="020B0604020202020204" pitchFamily="34" charset="0"/>
-            </a:endParaRPr>
           </a:p>
         </p:txBody>
       </p:sp>
@@ -9537,7 +9407,7 @@
         </p:nvSpPr>
         <p:spPr bwMode="auto">
           <a:xfrm>
-            <a:off x="2011683" y="6466171"/>
+            <a:off x="1402083" y="5780371"/>
             <a:ext cx="1148572" cy="498598"/>
           </a:xfrm>
           <a:prstGeom prst="rect">
@@ -9694,11 +9564,6 @@
               </a:rPr>
               <a:t>image</a:t>
             </a:r>
-            <a:endParaRPr lang="en-US" altLang="en-US" sz="1320" dirty="0">
-              <a:latin typeface="Arial" panose="020B0604020202020204" pitchFamily="34" charset="0"/>
-              <a:ea typeface="Amazon Ember" panose="020B0603020204020204" pitchFamily="34" charset="0"/>
-              <a:cs typeface="Arial" panose="020B0604020202020204" pitchFamily="34" charset="0"/>
-            </a:endParaRPr>
           </a:p>
         </p:txBody>
       </p:sp>
@@ -9731,7 +9596,7 @@
         </p:blipFill>
         <p:spPr bwMode="auto">
           <a:xfrm>
-            <a:off x="2311645" y="5941472"/>
+            <a:off x="1702045" y="5255672"/>
             <a:ext cx="548640" cy="548640"/>
           </a:xfrm>
           <a:prstGeom prst="rect">
@@ -9778,7 +9643,7 @@
         </p:nvSpPr>
         <p:spPr bwMode="auto">
           <a:xfrm>
-            <a:off x="3436851" y="8305975"/>
+            <a:off x="2827251" y="7620175"/>
             <a:ext cx="1419908" cy="295466"/>
           </a:xfrm>
           <a:prstGeom prst="rect">
@@ -9920,11 +9785,6 @@
               </a:rPr>
               <a:t>Amazon ECS</a:t>
             </a:r>
-            <a:endParaRPr lang="en-US" altLang="en-US" sz="1320" dirty="0">
-              <a:latin typeface="Arial" panose="020B0604020202020204" pitchFamily="34" charset="0"/>
-              <a:ea typeface="Amazon Ember" panose="020B0603020204020204" pitchFamily="34" charset="0"/>
-              <a:cs typeface="Arial" panose="020B0604020202020204" pitchFamily="34" charset="0"/>
-            </a:endParaRPr>
           </a:p>
         </p:txBody>
       </p:sp>
@@ -9945,7 +9805,7 @@
         </p:nvCxnSpPr>
         <p:spPr>
           <a:xfrm rot="16200000" flipH="1">
-            <a:off x="5713217" y="5407359"/>
+            <a:off x="5103617" y="4721559"/>
             <a:ext cx="3859476" cy="821483"/>
           </a:xfrm>
           <a:prstGeom prst="bentConnector3">
@@ -10005,7 +9865,7 @@
         </p:blipFill>
         <p:spPr bwMode="auto">
           <a:xfrm>
-            <a:off x="3871860" y="7757386"/>
+            <a:off x="3262260" y="7071586"/>
             <a:ext cx="548640" cy="548640"/>
           </a:xfrm>
           <a:prstGeom prst="rect">
@@ -10044,8 +9904,8 @@
         </p:nvSpPr>
         <p:spPr>
           <a:xfrm>
-            <a:off x="7927483" y="7279546"/>
-            <a:ext cx="576072" cy="264937"/>
+            <a:off x="6823958" y="6678357"/>
+            <a:ext cx="1602857" cy="238030"/>
           </a:xfrm>
           <a:prstGeom prst="rect">
             <a:avLst/>
@@ -10082,199 +9942,6 @@
           </a:p>
         </p:txBody>
       </p:sp>
-      <p:sp>
-        <p:nvSpPr>
-          <p:cNvPr id="71" name="Rectangle 70">
-            <a:extLst>
-              <a:ext uri="{FF2B5EF4-FFF2-40B4-BE49-F238E27FC236}">
-                <a16:creationId xmlns:a16="http://schemas.microsoft.com/office/drawing/2014/main" id="{3E67FA2E-A9FA-844D-A66D-648AE8044B50}"/>
-              </a:ext>
-            </a:extLst>
-          </p:cNvPr>
-          <p:cNvSpPr/>
-          <p:nvPr/>
-        </p:nvSpPr>
-        <p:spPr>
-          <a:xfrm>
-            <a:off x="6205359" y="7224188"/>
-            <a:ext cx="4068064" cy="1384109"/>
-          </a:xfrm>
-          <a:prstGeom prst="rect">
-            <a:avLst/>
-          </a:prstGeom>
-          <a:noFill/>
-          <a:ln w="12700">
-            <a:solidFill>
-              <a:srgbClr val="DF3312"/>
-            </a:solidFill>
-          </a:ln>
-        </p:spPr>
-        <p:style>
-          <a:lnRef idx="2">
-            <a:schemeClr val="accent1">
-              <a:shade val="50000"/>
-            </a:schemeClr>
-          </a:lnRef>
-          <a:fillRef idx="1">
-            <a:schemeClr val="accent1"/>
-          </a:fillRef>
-          <a:effectRef idx="0">
-            <a:schemeClr val="accent1"/>
-          </a:effectRef>
-          <a:fontRef idx="minor">
-            <a:schemeClr val="lt1"/>
-          </a:fontRef>
-        </p:style>
-        <p:txBody>
-          <a:bodyPr tIns="76810" anchorCtr="1"/>
-          <a:lstStyle>
-            <a:defPPr>
-              <a:defRPr lang="en-US"/>
-            </a:defPPr>
-            <a:lvl1pPr algn="l" rtl="0" eaLnBrk="0" fontAlgn="base" hangingPunct="0">
-              <a:spcBef>
-                <a:spcPct val="0"/>
-              </a:spcBef>
-              <a:spcAft>
-                <a:spcPct val="0"/>
-              </a:spcAft>
-              <a:defRPr kern="1200">
-                <a:solidFill>
-                  <a:schemeClr val="lt1"/>
-                </a:solidFill>
-                <a:latin typeface="+mn-lt"/>
-                <a:ea typeface="+mn-ea"/>
-                <a:cs typeface="+mn-cs"/>
-              </a:defRPr>
-            </a:lvl1pPr>
-            <a:lvl2pPr marL="457200" algn="l" rtl="0" eaLnBrk="0" fontAlgn="base" hangingPunct="0">
-              <a:spcBef>
-                <a:spcPct val="0"/>
-              </a:spcBef>
-              <a:spcAft>
-                <a:spcPct val="0"/>
-              </a:spcAft>
-              <a:defRPr kern="1200">
-                <a:solidFill>
-                  <a:schemeClr val="lt1"/>
-                </a:solidFill>
-                <a:latin typeface="+mn-lt"/>
-                <a:ea typeface="+mn-ea"/>
-                <a:cs typeface="+mn-cs"/>
-              </a:defRPr>
-            </a:lvl2pPr>
-            <a:lvl3pPr marL="914400" algn="l" rtl="0" eaLnBrk="0" fontAlgn="base" hangingPunct="0">
-              <a:spcBef>
-                <a:spcPct val="0"/>
-              </a:spcBef>
-              <a:spcAft>
-                <a:spcPct val="0"/>
-              </a:spcAft>
-              <a:defRPr kern="1200">
-                <a:solidFill>
-                  <a:schemeClr val="lt1"/>
-                </a:solidFill>
-                <a:latin typeface="+mn-lt"/>
-                <a:ea typeface="+mn-ea"/>
-                <a:cs typeface="+mn-cs"/>
-              </a:defRPr>
-            </a:lvl3pPr>
-            <a:lvl4pPr marL="1371600" algn="l" rtl="0" eaLnBrk="0" fontAlgn="base" hangingPunct="0">
-              <a:spcBef>
-                <a:spcPct val="0"/>
-              </a:spcBef>
-              <a:spcAft>
-                <a:spcPct val="0"/>
-              </a:spcAft>
-              <a:defRPr kern="1200">
-                <a:solidFill>
-                  <a:schemeClr val="lt1"/>
-                </a:solidFill>
-                <a:latin typeface="+mn-lt"/>
-                <a:ea typeface="+mn-ea"/>
-                <a:cs typeface="+mn-cs"/>
-              </a:defRPr>
-            </a:lvl4pPr>
-            <a:lvl5pPr marL="1828800" algn="l" rtl="0" eaLnBrk="0" fontAlgn="base" hangingPunct="0">
-              <a:spcBef>
-                <a:spcPct val="0"/>
-              </a:spcBef>
-              <a:spcAft>
-                <a:spcPct val="0"/>
-              </a:spcAft>
-              <a:defRPr kern="1200">
-                <a:solidFill>
-                  <a:schemeClr val="lt1"/>
-                </a:solidFill>
-                <a:latin typeface="+mn-lt"/>
-                <a:ea typeface="+mn-ea"/>
-                <a:cs typeface="+mn-cs"/>
-              </a:defRPr>
-            </a:lvl5pPr>
-            <a:lvl6pPr marL="2286000" algn="l" defTabSz="914400" rtl="0" eaLnBrk="1" latinLnBrk="0" hangingPunct="1">
-              <a:defRPr kern="1200">
-                <a:solidFill>
-                  <a:schemeClr val="lt1"/>
-                </a:solidFill>
-                <a:latin typeface="+mn-lt"/>
-                <a:ea typeface="+mn-ea"/>
-                <a:cs typeface="+mn-cs"/>
-              </a:defRPr>
-            </a:lvl6pPr>
-            <a:lvl7pPr marL="2743200" algn="l" defTabSz="914400" rtl="0" eaLnBrk="1" latinLnBrk="0" hangingPunct="1">
-              <a:defRPr kern="1200">
-                <a:solidFill>
-                  <a:schemeClr val="lt1"/>
-                </a:solidFill>
-                <a:latin typeface="+mn-lt"/>
-                <a:ea typeface="+mn-ea"/>
-                <a:cs typeface="+mn-cs"/>
-              </a:defRPr>
-            </a:lvl7pPr>
-            <a:lvl8pPr marL="3200400" algn="l" defTabSz="914400" rtl="0" eaLnBrk="1" latinLnBrk="0" hangingPunct="1">
-              <a:defRPr kern="1200">
-                <a:solidFill>
-                  <a:schemeClr val="lt1"/>
-                </a:solidFill>
-                <a:latin typeface="+mn-lt"/>
-                <a:ea typeface="+mn-ea"/>
-                <a:cs typeface="+mn-cs"/>
-              </a:defRPr>
-            </a:lvl8pPr>
-            <a:lvl9pPr marL="3657600" algn="l" defTabSz="914400" rtl="0" eaLnBrk="1" latinLnBrk="0" hangingPunct="1">
-              <a:defRPr kern="1200">
-                <a:solidFill>
-                  <a:schemeClr val="lt1"/>
-                </a:solidFill>
-                <a:latin typeface="+mn-lt"/>
-                <a:ea typeface="+mn-ea"/>
-                <a:cs typeface="+mn-cs"/>
-              </a:defRPr>
-            </a:lvl9pPr>
-          </a:lstStyle>
-          <a:p>
-            <a:pPr eaLnBrk="1" fontAlgn="auto" hangingPunct="1">
-              <a:spcBef>
-                <a:spcPts val="0"/>
-              </a:spcBef>
-              <a:spcAft>
-                <a:spcPts val="0"/>
-              </a:spcAft>
-              <a:defRPr/>
-            </a:pPr>
-            <a:r>
-              <a:rPr lang="en-US" sz="1320" dirty="0">
-                <a:solidFill>
-                  <a:srgbClr val="DF3312"/>
-                </a:solidFill>
-                <a:latin typeface="Arial" panose="020B0604020202020204" pitchFamily="34" charset="0"/>
-                <a:cs typeface="Arial" panose="020B0604020202020204" pitchFamily="34" charset="0"/>
-              </a:rPr>
-              <a:t>Security group</a:t>
-            </a:r>
-          </a:p>
-        </p:txBody>
-      </p:sp>
       <p:cxnSp>
         <p:nvCxnSpPr>
           <p:cNvPr id="128" name="Elbow Connector 60">
@@ -10286,14 +9953,14 @@
           </p:cNvPr>
           <p:cNvCxnSpPr>
             <a:cxnSpLocks/>
-            <a:stCxn id="101" idx="1"/>
-            <a:endCxn id="40" idx="3"/>
+            <a:stCxn id="40" idx="3"/>
+            <a:endCxn id="101" idx="1"/>
           </p:cNvCxnSpPr>
           <p:nvPr/>
         </p:nvCxnSpPr>
         <p:spPr>
-          <a:xfrm flipH="1">
-            <a:off x="2860289" y="8031706"/>
+          <a:xfrm>
+            <a:off x="2250685" y="7345906"/>
             <a:ext cx="1011575" cy="0"/>
           </a:xfrm>
           <a:prstGeom prst="straightConnector1">
@@ -10340,7 +10007,7 @@
         </p:nvCxnSpPr>
         <p:spPr>
           <a:xfrm flipV="1">
-            <a:off x="2585966" y="5696040"/>
+            <a:off x="1976366" y="5010240"/>
             <a:ext cx="1" cy="245433"/>
           </a:xfrm>
           <a:prstGeom prst="straightConnector1">
@@ -10387,7 +10054,7 @@
         </p:nvCxnSpPr>
         <p:spPr>
           <a:xfrm flipH="1" flipV="1">
-            <a:off x="2584691" y="4518751"/>
+            <a:off x="1975091" y="3832951"/>
             <a:ext cx="1275" cy="338436"/>
           </a:xfrm>
           <a:prstGeom prst="straightConnector1">
@@ -10434,7 +10101,7 @@
         </p:nvCxnSpPr>
         <p:spPr>
           <a:xfrm flipV="1">
-            <a:off x="2860287" y="3952184"/>
+            <a:off x="2250687" y="3266384"/>
             <a:ext cx="607408" cy="5620"/>
           </a:xfrm>
           <a:prstGeom prst="straightConnector1">
@@ -10477,7 +10144,7 @@
         </p:nvSpPr>
         <p:spPr>
           <a:xfrm>
-            <a:off x="1983058" y="7189212"/>
+            <a:off x="1373458" y="6503412"/>
             <a:ext cx="2912130" cy="1615366"/>
           </a:xfrm>
           <a:prstGeom prst="rect">
@@ -10524,11 +10191,350 @@
               </a:rPr>
               <a:t>Image discovery</a:t>
             </a:r>
+          </a:p>
+        </p:txBody>
+      </p:sp>
+      <p:sp>
+        <p:nvSpPr>
+          <p:cNvPr id="87" name="Rectangle 86">
+            <a:extLst>
+              <a:ext uri="{FF2B5EF4-FFF2-40B4-BE49-F238E27FC236}">
+                <a16:creationId xmlns:a16="http://schemas.microsoft.com/office/drawing/2014/main" id="{FFA89DF7-D079-0947-8E29-4EEA4975DBBD}"/>
+              </a:ext>
+            </a:extLst>
+          </p:cNvPr>
+          <p:cNvSpPr/>
+          <p:nvPr/>
+        </p:nvSpPr>
+        <p:spPr>
+          <a:xfrm>
+            <a:off x="5638285" y="6573878"/>
+            <a:ext cx="4064087" cy="1341763"/>
+          </a:xfrm>
+          <a:prstGeom prst="rect">
+            <a:avLst/>
+          </a:prstGeom>
+          <a:noFill/>
+          <a:ln w="12700">
+            <a:solidFill>
+              <a:srgbClr val="5A6B86"/>
+            </a:solidFill>
+            <a:prstDash val="dash"/>
+          </a:ln>
+        </p:spPr>
+        <p:style>
+          <a:lnRef idx="2">
+            <a:schemeClr val="accent1">
+              <a:shade val="50000"/>
+            </a:schemeClr>
+          </a:lnRef>
+          <a:fillRef idx="1">
+            <a:schemeClr val="accent1"/>
+          </a:fillRef>
+          <a:effectRef idx="0">
+            <a:schemeClr val="accent1"/>
+          </a:effectRef>
+          <a:fontRef idx="minor">
+            <a:schemeClr val="lt1"/>
+          </a:fontRef>
+        </p:style>
+        <p:txBody>
+          <a:bodyPr tIns="109728"/>
+          <a:lstStyle/>
+          <a:p>
+            <a:pPr algn="ctr">
+              <a:defRPr/>
+            </a:pPr>
+            <a:r>
+              <a:rPr lang="en-US" sz="1320" dirty="0" smtClean="0">
+                <a:solidFill>
+                  <a:srgbClr val="5A6B86"/>
+                </a:solidFill>
+                <a:latin typeface="Arial" panose="020B0604020202020204" pitchFamily="34" charset="0"/>
+                <a:cs typeface="Arial" panose="020B0604020202020204" pitchFamily="34" charset="0"/>
+              </a:rPr>
+              <a:t>Serverless </a:t>
+            </a:r>
+            <a:r>
+              <a:rPr lang="en-US" sz="1320" dirty="0">
+                <a:solidFill>
+                  <a:srgbClr val="5A6B86"/>
+                </a:solidFill>
+                <a:latin typeface="Arial" panose="020B0604020202020204" pitchFamily="34" charset="0"/>
+                <a:cs typeface="Arial" panose="020B0604020202020204" pitchFamily="34" charset="0"/>
+              </a:rPr>
+              <a:t>managed </a:t>
+            </a:r>
+            <a:r>
+              <a:rPr lang="en-US" sz="1320" dirty="0" smtClean="0">
+                <a:solidFill>
+                  <a:srgbClr val="5A6B86"/>
+                </a:solidFill>
+                <a:latin typeface="Arial" panose="020B0604020202020204" pitchFamily="34" charset="0"/>
+                <a:cs typeface="Arial" panose="020B0604020202020204" pitchFamily="34" charset="0"/>
+              </a:rPr>
+              <a:t>Fargate </a:t>
+            </a:r>
+            <a:r>
+              <a:rPr lang="en-US" sz="1320" dirty="0">
+                <a:solidFill>
+                  <a:srgbClr val="5A6B86"/>
+                </a:solidFill>
+                <a:latin typeface="Arial" panose="020B0604020202020204" pitchFamily="34" charset="0"/>
+                <a:cs typeface="Arial" panose="020B0604020202020204" pitchFamily="34" charset="0"/>
+              </a:rPr>
+              <a:t>cluster</a:t>
+            </a:r>
+            <a:r>
+              <a:rPr lang="en-US" sz="1320" dirty="0" smtClean="0">
+                <a:solidFill>
+                  <a:srgbClr val="5A6B86"/>
+                </a:solidFill>
+                <a:latin typeface="Arial" panose="020B0604020202020204" pitchFamily="34" charset="0"/>
+                <a:cs typeface="Arial" panose="020B0604020202020204" pitchFamily="34" charset="0"/>
+              </a:rPr>
+              <a:t> </a:t>
+            </a:r>
             <a:endParaRPr lang="en-US" sz="1320" dirty="0">
               <a:solidFill>
                 <a:srgbClr val="5A6B86"/>
               </a:solidFill>
               <a:latin typeface="Arial" panose="020B0604020202020204" pitchFamily="34" charset="0"/>
+              <a:cs typeface="Arial" panose="020B0604020202020204" pitchFamily="34" charset="0"/>
+            </a:endParaRPr>
+          </a:p>
+        </p:txBody>
+      </p:sp>
+      <p:sp>
+        <p:nvSpPr>
+          <p:cNvPr id="99" name="Rectangle 98">
+            <a:extLst>
+              <a:ext uri="{FF2B5EF4-FFF2-40B4-BE49-F238E27FC236}">
+                <a16:creationId xmlns:a16="http://schemas.microsoft.com/office/drawing/2014/main" id="{3E67FA2E-A9FA-844D-A66D-648AE8044B50}"/>
+              </a:ext>
+            </a:extLst>
+          </p:cNvPr>
+          <p:cNvSpPr/>
+          <p:nvPr/>
+        </p:nvSpPr>
+        <p:spPr>
+          <a:xfrm>
+            <a:off x="5652755" y="8534400"/>
+            <a:ext cx="4049617" cy="1341660"/>
+          </a:xfrm>
+          <a:prstGeom prst="rect">
+            <a:avLst/>
+          </a:prstGeom>
+          <a:noFill/>
+          <a:ln w="12700">
+            <a:solidFill>
+              <a:srgbClr val="DF3312"/>
+            </a:solidFill>
+          </a:ln>
+        </p:spPr>
+        <p:style>
+          <a:lnRef idx="2">
+            <a:schemeClr val="accent1">
+              <a:shade val="50000"/>
+            </a:schemeClr>
+          </a:lnRef>
+          <a:fillRef idx="1">
+            <a:schemeClr val="accent1"/>
+          </a:fillRef>
+          <a:effectRef idx="0">
+            <a:schemeClr val="accent1"/>
+          </a:effectRef>
+          <a:fontRef idx="minor">
+            <a:schemeClr val="lt1"/>
+          </a:fontRef>
+        </p:style>
+        <p:txBody>
+          <a:bodyPr tIns="91440" anchorCtr="1"/>
+          <a:lstStyle/>
+          <a:p>
+            <a:pPr eaLnBrk="1" fontAlgn="auto" hangingPunct="1">
+              <a:spcBef>
+                <a:spcPts val="0"/>
+              </a:spcBef>
+              <a:spcAft>
+                <a:spcPts val="0"/>
+              </a:spcAft>
+              <a:defRPr/>
+            </a:pPr>
+            <a:r>
+              <a:rPr lang="en-US" sz="1320" dirty="0">
+                <a:solidFill>
+                  <a:srgbClr val="DF3312"/>
+                </a:solidFill>
+                <a:latin typeface="Arial" panose="020B0604020202020204" pitchFamily="34" charset="0"/>
+                <a:cs typeface="Arial" panose="020B0604020202020204" pitchFamily="34" charset="0"/>
+              </a:rPr>
+              <a:t>Security group</a:t>
+            </a:r>
+          </a:p>
+        </p:txBody>
+      </p:sp>
+      <p:sp>
+        <p:nvSpPr>
+          <p:cNvPr id="103" name="TextBox 16">
+            <a:extLst>
+              <a:ext uri="{FF2B5EF4-FFF2-40B4-BE49-F238E27FC236}">
+                <a16:creationId xmlns:a16="http://schemas.microsoft.com/office/drawing/2014/main" id="{B30F4969-F73B-2145-B92C-809596CF1489}"/>
+              </a:ext>
+            </a:extLst>
+          </p:cNvPr>
+          <p:cNvSpPr txBox="1">
+            <a:spLocks noChangeArrowheads="1"/>
+          </p:cNvSpPr>
+          <p:nvPr/>
+        </p:nvSpPr>
+        <p:spPr bwMode="auto">
+          <a:xfrm>
+            <a:off x="6349182" y="8589182"/>
+            <a:ext cx="684173" cy="295466"/>
+          </a:xfrm>
+          <a:prstGeom prst="rect">
+            <a:avLst/>
+          </a:prstGeom>
+          <a:noFill/>
+          <a:ln>
+            <a:noFill/>
+          </a:ln>
+          <a:extLst>
+            <a:ext uri="{909E8E84-426E-40DD-AFC4-6F175D3DCCD1}">
+              <a14:hiddenFill xmlns:a14="http://schemas.microsoft.com/office/drawing/2010/main">
+                <a:solidFill>
+                  <a:srgbClr val="FFFFFF"/>
+                </a:solidFill>
+              </a14:hiddenFill>
+            </a:ext>
+            <a:ext uri="{91240B29-F687-4F45-9708-019B960494DF}">
+              <a14:hiddenLine xmlns:a14="http://schemas.microsoft.com/office/drawing/2010/main" w="9525">
+                <a:solidFill>
+                  <a:srgbClr val="000000"/>
+                </a:solidFill>
+                <a:miter lim="800000"/>
+                <a:headEnd/>
+                <a:tailEnd/>
+              </a14:hiddenLine>
+            </a:ext>
+          </a:extLst>
+        </p:spPr>
+        <p:txBody>
+          <a:bodyPr wrap="square">
+            <a:spAutoFit/>
+          </a:bodyPr>
+          <a:lstStyle>
+            <a:lvl1pPr>
+              <a:defRPr>
+                <a:solidFill>
+                  <a:schemeClr val="tx1"/>
+                </a:solidFill>
+                <a:latin typeface="Calibri" panose="020F0502020204030204" pitchFamily="34" charset="0"/>
+              </a:defRPr>
+            </a:lvl1pPr>
+            <a:lvl2pPr marL="742950" indent="-285750">
+              <a:defRPr>
+                <a:solidFill>
+                  <a:schemeClr val="tx1"/>
+                </a:solidFill>
+                <a:latin typeface="Calibri" panose="020F0502020204030204" pitchFamily="34" charset="0"/>
+              </a:defRPr>
+            </a:lvl2pPr>
+            <a:lvl3pPr marL="1143000" indent="-228600">
+              <a:defRPr>
+                <a:solidFill>
+                  <a:schemeClr val="tx1"/>
+                </a:solidFill>
+                <a:latin typeface="Calibri" panose="020F0502020204030204" pitchFamily="34" charset="0"/>
+              </a:defRPr>
+            </a:lvl3pPr>
+            <a:lvl4pPr marL="1600200" indent="-228600">
+              <a:defRPr>
+                <a:solidFill>
+                  <a:schemeClr val="tx1"/>
+                </a:solidFill>
+                <a:latin typeface="Calibri" panose="020F0502020204030204" pitchFamily="34" charset="0"/>
+              </a:defRPr>
+            </a:lvl4pPr>
+            <a:lvl5pPr marL="2057400" indent="-228600">
+              <a:defRPr>
+                <a:solidFill>
+                  <a:schemeClr val="tx1"/>
+                </a:solidFill>
+                <a:latin typeface="Calibri" panose="020F0502020204030204" pitchFamily="34" charset="0"/>
+              </a:defRPr>
+            </a:lvl5pPr>
+            <a:lvl6pPr marL="2514600" indent="-228600" eaLnBrk="0" fontAlgn="base" hangingPunct="0">
+              <a:spcBef>
+                <a:spcPct val="0"/>
+              </a:spcBef>
+              <a:spcAft>
+                <a:spcPct val="0"/>
+              </a:spcAft>
+              <a:defRPr>
+                <a:solidFill>
+                  <a:schemeClr val="tx1"/>
+                </a:solidFill>
+                <a:latin typeface="Calibri" panose="020F0502020204030204" pitchFamily="34" charset="0"/>
+              </a:defRPr>
+            </a:lvl6pPr>
+            <a:lvl7pPr marL="2971800" indent="-228600" eaLnBrk="0" fontAlgn="base" hangingPunct="0">
+              <a:spcBef>
+                <a:spcPct val="0"/>
+              </a:spcBef>
+              <a:spcAft>
+                <a:spcPct val="0"/>
+              </a:spcAft>
+              <a:defRPr>
+                <a:solidFill>
+                  <a:schemeClr val="tx1"/>
+                </a:solidFill>
+                <a:latin typeface="Calibri" panose="020F0502020204030204" pitchFamily="34" charset="0"/>
+              </a:defRPr>
+            </a:lvl7pPr>
+            <a:lvl8pPr marL="3429000" indent="-228600" eaLnBrk="0" fontAlgn="base" hangingPunct="0">
+              <a:spcBef>
+                <a:spcPct val="0"/>
+              </a:spcBef>
+              <a:spcAft>
+                <a:spcPct val="0"/>
+              </a:spcAft>
+              <a:defRPr>
+                <a:solidFill>
+                  <a:schemeClr val="tx1"/>
+                </a:solidFill>
+                <a:latin typeface="Calibri" panose="020F0502020204030204" pitchFamily="34" charset="0"/>
+              </a:defRPr>
+            </a:lvl8pPr>
+            <a:lvl9pPr marL="3886200" indent="-228600" eaLnBrk="0" fontAlgn="base" hangingPunct="0">
+              <a:spcBef>
+                <a:spcPct val="0"/>
+              </a:spcBef>
+              <a:spcAft>
+                <a:spcPct val="0"/>
+              </a:spcAft>
+              <a:defRPr>
+                <a:solidFill>
+                  <a:schemeClr val="tx1"/>
+                </a:solidFill>
+                <a:latin typeface="Calibri" panose="020F0502020204030204" pitchFamily="34" charset="0"/>
+              </a:defRPr>
+            </a:lvl9pPr>
+          </a:lstStyle>
+          <a:p>
+            <a:pPr algn="ctr"/>
+            <a:r>
+              <a:rPr lang="en-US" altLang="en-US" sz="1320" dirty="0" smtClean="0">
+                <a:latin typeface="Arial" panose="020B0604020202020204" pitchFamily="34" charset="0"/>
+                <a:ea typeface="Amazon Ember" panose="020B0603020204020204" pitchFamily="34" charset="0"/>
+                <a:cs typeface="Arial" panose="020B0604020202020204" pitchFamily="34" charset="0"/>
+              </a:rPr>
+              <a:t>or…?</a:t>
+            </a:r>
+            <a:endParaRPr lang="en-US" altLang="en-US" sz="1320" dirty="0">
+              <a:latin typeface="Arial" panose="020B0604020202020204" pitchFamily="34" charset="0"/>
+              <a:ea typeface="Amazon Ember" panose="020B0603020204020204" pitchFamily="34" charset="0"/>
               <a:cs typeface="Arial" panose="020B0604020202020204" pitchFamily="34" charset="0"/>
             </a:endParaRPr>
           </a:p>
@@ -12112,23 +12118,7 @@
                 <a:ea typeface="Amazon Ember" panose="020B0603020204020204" pitchFamily="34" charset="0"/>
                 <a:cs typeface="Arial" panose="020B0604020202020204" pitchFamily="34" charset="0"/>
               </a:rPr>
-              <a:t>CloudWatch </a:t>
-            </a:r>
-            <a:r>
-              <a:rPr lang="en-US" altLang="en-US" sz="1320" dirty="0">
-                <a:latin typeface="Arial" panose="020B0604020202020204" pitchFamily="34" charset="0"/>
-                <a:ea typeface="Amazon Ember" panose="020B0603020204020204" pitchFamily="34" charset="0"/>
-                <a:cs typeface="Arial" panose="020B0604020202020204" pitchFamily="34" charset="0"/>
-              </a:rPr>
-              <a:t>event</a:t>
-            </a:r>
-            <a:r>
-              <a:rPr lang="en-US" altLang="en-US" sz="1320" dirty="0">
-                <a:latin typeface="Arial" panose="020B0604020202020204" pitchFamily="34" charset="0"/>
-                <a:ea typeface="Amazon Ember" panose="020B0603020204020204" pitchFamily="34" charset="0"/>
-                <a:cs typeface="Arial" panose="020B0604020202020204" pitchFamily="34" charset="0"/>
-              </a:rPr>
-              <a:t/>
+              <a:t>CloudWatch event</a:t>
             </a:r>
             <a:br>
               <a:rPr lang="en-US" altLang="en-US" sz="1320" dirty="0">
@@ -12364,23 +12354,7 @@
                 <a:ea typeface="Amazon Ember" panose="020B0603020204020204" pitchFamily="34" charset="0"/>
                 <a:cs typeface="Arial" panose="020B0604020202020204" pitchFamily="34" charset="0"/>
               </a:rPr>
-              <a:t>CloudWatch </a:t>
-            </a:r>
-            <a:r>
-              <a:rPr lang="en-US" altLang="en-US" sz="1320" dirty="0">
-                <a:latin typeface="Arial" panose="020B0604020202020204" pitchFamily="34" charset="0"/>
-                <a:ea typeface="Amazon Ember" panose="020B0603020204020204" pitchFamily="34" charset="0"/>
-                <a:cs typeface="Arial" panose="020B0604020202020204" pitchFamily="34" charset="0"/>
-              </a:rPr>
-              <a:t>event</a:t>
-            </a:r>
-            <a:r>
-              <a:rPr lang="en-US" altLang="en-US" sz="1320" dirty="0">
-                <a:latin typeface="Arial" panose="020B0604020202020204" pitchFamily="34" charset="0"/>
-                <a:ea typeface="Amazon Ember" panose="020B0603020204020204" pitchFamily="34" charset="0"/>
-                <a:cs typeface="Arial" panose="020B0604020202020204" pitchFamily="34" charset="0"/>
-              </a:rPr>
-              <a:t/>
+              <a:t>CloudWatch event</a:t>
             </a:r>
             <a:br>
               <a:rPr lang="en-US" altLang="en-US" sz="1320" dirty="0">
@@ -12618,11 +12592,6 @@
               </a:rPr>
               <a:t>CodePipeline</a:t>
             </a:r>
-            <a:endParaRPr lang="en-US" altLang="en-US" sz="1320" dirty="0">
-              <a:latin typeface="Arial" panose="020B0604020202020204" pitchFamily="34" charset="0"/>
-              <a:ea typeface="Amazon Ember" panose="020B0603020204020204" pitchFamily="34" charset="0"/>
-              <a:cs typeface="Arial" panose="020B0604020202020204" pitchFamily="34" charset="0"/>
-            </a:endParaRPr>
           </a:p>
         </p:txBody>
       </p:sp>
@@ -12844,11 +12813,6 @@
               </a:rPr>
               <a:t>CodeCommit</a:t>
             </a:r>
-            <a:endParaRPr lang="en-US" altLang="en-US" sz="1320" dirty="0">
-              <a:latin typeface="Arial" panose="020B0604020202020204" pitchFamily="34" charset="0"/>
-              <a:ea typeface="Amazon Ember" panose="020B0603020204020204" pitchFamily="34" charset="0"/>
-              <a:cs typeface="Arial" panose="020B0604020202020204" pitchFamily="34" charset="0"/>
-            </a:endParaRPr>
           </a:p>
         </p:txBody>
       </p:sp>
@@ -13070,11 +13034,6 @@
               </a:rPr>
               <a:t>CodeBuild</a:t>
             </a:r>
-            <a:endParaRPr lang="en-US" altLang="en-US" sz="1320" dirty="0">
-              <a:latin typeface="Arial" panose="020B0604020202020204" pitchFamily="34" charset="0"/>
-              <a:ea typeface="Amazon Ember" panose="020B0603020204020204" pitchFamily="34" charset="0"/>
-              <a:cs typeface="Arial" panose="020B0604020202020204" pitchFamily="34" charset="0"/>
-            </a:endParaRPr>
           </a:p>
         </p:txBody>
       </p:sp>
@@ -13295,14 +13254,6 @@
                 <a:cs typeface="Arial" panose="020B0604020202020204" pitchFamily="34" charset="0"/>
               </a:rPr>
               <a:t>AWS Secrets </a:t>
-            </a:r>
-            <a:r>
-              <a:rPr lang="en-US" altLang="en-US" sz="1320" dirty="0">
-                <a:latin typeface="Arial" panose="020B0604020202020204" pitchFamily="34" charset="0"/>
-                <a:ea typeface="Amazon Ember" panose="020B0603020204020204" pitchFamily="34" charset="0"/>
-                <a:cs typeface="Arial" panose="020B0604020202020204" pitchFamily="34" charset="0"/>
-              </a:rPr>
-              <a:t/>
             </a:r>
             <a:br>
               <a:rPr lang="en-US" altLang="en-US" sz="1320" dirty="0">
@@ -13319,11 +13270,6 @@
               </a:rPr>
               <a:t>Manager</a:t>
             </a:r>
-            <a:endParaRPr lang="en-US" altLang="en-US" sz="1320" dirty="0">
-              <a:latin typeface="Arial" panose="020B0604020202020204" pitchFamily="34" charset="0"/>
-              <a:ea typeface="Amazon Ember" panose="020B0603020204020204" pitchFamily="34" charset="0"/>
-              <a:cs typeface="Arial" panose="020B0604020202020204" pitchFamily="34" charset="0"/>
-            </a:endParaRPr>
           </a:p>
         </p:txBody>
       </p:sp>
@@ -13933,23 +13879,7 @@
                 <a:ea typeface="Amazon Ember" panose="020B0603020204020204" pitchFamily="34" charset="0"/>
                 <a:cs typeface="Arial" panose="020B0604020202020204" pitchFamily="34" charset="0"/>
               </a:rPr>
-              <a:t>CloudWatch </a:t>
-            </a:r>
-            <a:r>
-              <a:rPr lang="en-US" altLang="en-US" sz="1320" dirty="0">
-                <a:latin typeface="Arial" panose="020B0604020202020204" pitchFamily="34" charset="0"/>
-                <a:ea typeface="Amazon Ember" panose="020B0603020204020204" pitchFamily="34" charset="0"/>
-                <a:cs typeface="Arial" panose="020B0604020202020204" pitchFamily="34" charset="0"/>
-              </a:rPr>
-              <a:t>event</a:t>
-            </a:r>
-            <a:r>
-              <a:rPr lang="en-US" altLang="en-US" sz="1320" dirty="0">
-                <a:latin typeface="Arial" panose="020B0604020202020204" pitchFamily="34" charset="0"/>
-                <a:ea typeface="Amazon Ember" panose="020B0603020204020204" pitchFamily="34" charset="0"/>
-                <a:cs typeface="Arial" panose="020B0604020202020204" pitchFamily="34" charset="0"/>
-              </a:rPr>
-              <a:t/>
+              <a:t>CloudWatch event</a:t>
             </a:r>
             <a:br>
               <a:rPr lang="en-US" altLang="en-US" sz="1320" dirty="0">
@@ -14185,15 +14115,7 @@
                 <a:ea typeface="Amazon Ember" panose="020B0603020204020204" pitchFamily="34" charset="0"/>
                 <a:cs typeface="Arial" panose="020B0604020202020204" pitchFamily="34" charset="0"/>
               </a:rPr>
-              <a:t>Systems </a:t>
-            </a:r>
-            <a:r>
-              <a:rPr lang="en-US" altLang="en-US" sz="1320" dirty="0">
-                <a:latin typeface="Arial" panose="020B0604020202020204" pitchFamily="34" charset="0"/>
-                <a:ea typeface="Amazon Ember" panose="020B0603020204020204" pitchFamily="34" charset="0"/>
-                <a:cs typeface="Arial" panose="020B0604020202020204" pitchFamily="34" charset="0"/>
-              </a:rPr>
-              <a:t>Manager</a:t>
+              <a:t>Systems Manager</a:t>
             </a:r>
           </a:p>
           <a:p>
@@ -14204,29 +14126,8 @@
                 <a:ea typeface="Amazon Ember" panose="020B0603020204020204" pitchFamily="34" charset="0"/>
                 <a:cs typeface="Arial" panose="020B0604020202020204" pitchFamily="34" charset="0"/>
               </a:rPr>
-              <a:t>Parameter </a:t>
+              <a:t>Parameter Store</a:t>
             </a:r>
-            <a:r>
-              <a:rPr lang="en-US" altLang="en-US" sz="1320" dirty="0">
-                <a:latin typeface="Arial" panose="020B0604020202020204" pitchFamily="34" charset="0"/>
-                <a:ea typeface="Amazon Ember" panose="020B0603020204020204" pitchFamily="34" charset="0"/>
-                <a:cs typeface="Arial" panose="020B0604020202020204" pitchFamily="34" charset="0"/>
-              </a:rPr>
-              <a:t>S</a:t>
-            </a:r>
-            <a:r>
-              <a:rPr lang="en-US" altLang="en-US" sz="1320" dirty="0">
-                <a:latin typeface="Arial" panose="020B0604020202020204" pitchFamily="34" charset="0"/>
-                <a:ea typeface="Amazon Ember" panose="020B0603020204020204" pitchFamily="34" charset="0"/>
-                <a:cs typeface="Arial" panose="020B0604020202020204" pitchFamily="34" charset="0"/>
-              </a:rPr>
-              <a:t>tore</a:t>
-            </a:r>
-            <a:endParaRPr lang="en-US" altLang="en-US" sz="1320" dirty="0">
-              <a:latin typeface="Arial" panose="020B0604020202020204" pitchFamily="34" charset="0"/>
-              <a:ea typeface="Amazon Ember" panose="020B0603020204020204" pitchFamily="34" charset="0"/>
-              <a:cs typeface="Arial" panose="020B0604020202020204" pitchFamily="34" charset="0"/>
-            </a:endParaRPr>
           </a:p>
         </p:txBody>
       </p:sp>
@@ -14508,11 +14409,6 @@
               </a:rPr>
               <a:t>Lambda</a:t>
             </a:r>
-            <a:endParaRPr lang="en-US" altLang="en-US" sz="1320" dirty="0">
-              <a:latin typeface="Arial" panose="020B0604020202020204" pitchFamily="34" charset="0"/>
-              <a:ea typeface="Amazon Ember" panose="020B0603020204020204" pitchFamily="34" charset="0"/>
-              <a:cs typeface="Arial" panose="020B0604020202020204" pitchFamily="34" charset="0"/>
-            </a:endParaRPr>
           </a:p>
         </p:txBody>
       </p:sp>
@@ -14734,11 +14630,6 @@
               </a:rPr>
               <a:t>Lambda</a:t>
             </a:r>
-            <a:endParaRPr lang="en-US" altLang="en-US" sz="1320" dirty="0">
-              <a:latin typeface="Arial" panose="020B0604020202020204" pitchFamily="34" charset="0"/>
-              <a:ea typeface="Amazon Ember" panose="020B0603020204020204" pitchFamily="34" charset="0"/>
-              <a:cs typeface="Arial" panose="020B0604020202020204" pitchFamily="34" charset="0"/>
-            </a:endParaRPr>
           </a:p>
         </p:txBody>
       </p:sp>
@@ -14960,11 +14851,6 @@
               </a:rPr>
               <a:t>Lambda</a:t>
             </a:r>
-            <a:endParaRPr lang="en-US" altLang="en-US" sz="1320" dirty="0">
-              <a:latin typeface="Arial" panose="020B0604020202020204" pitchFamily="34" charset="0"/>
-              <a:ea typeface="Amazon Ember" panose="020B0603020204020204" pitchFamily="34" charset="0"/>
-              <a:cs typeface="Arial" panose="020B0604020202020204" pitchFamily="34" charset="0"/>
-            </a:endParaRPr>
           </a:p>
         </p:txBody>
       </p:sp>
@@ -15506,13 +15392,6 @@
               </a:rPr>
               <a:t>Public subnet</a:t>
             </a:r>
-            <a:endParaRPr lang="en-US" sz="1320" dirty="0">
-              <a:solidFill>
-                <a:srgbClr val="1E8900"/>
-              </a:solidFill>
-              <a:latin typeface="Arial" panose="020B0604020202020204" pitchFamily="34" charset="0"/>
-              <a:cs typeface="Arial" panose="020B0604020202020204" pitchFamily="34" charset="0"/>
-            </a:endParaRPr>
           </a:p>
         </p:txBody>
       </p:sp>
@@ -16347,29 +16226,8 @@
                 <a:ea typeface="Amazon Ember" panose="020B0603020204020204" pitchFamily="34" charset="0"/>
                 <a:cs typeface="Arial" panose="020B0604020202020204" pitchFamily="34" charset="0"/>
               </a:rPr>
-              <a:t>CloudWatch</a:t>
+              <a:t>CloudWatch CPU &amp; memory alarms</a:t>
             </a:r>
-            <a:r>
-              <a:rPr lang="en-US" altLang="en-US" sz="1320" dirty="0">
-                <a:latin typeface="Arial" panose="020B0604020202020204" pitchFamily="34" charset="0"/>
-                <a:ea typeface="Amazon Ember" panose="020B0603020204020204" pitchFamily="34" charset="0"/>
-                <a:cs typeface="Arial" panose="020B0604020202020204" pitchFamily="34" charset="0"/>
-              </a:rPr>
-              <a:t> CPU &amp; memory </a:t>
-            </a:r>
-            <a:r>
-              <a:rPr lang="en-US" altLang="en-US" sz="1320" dirty="0">
-                <a:latin typeface="Arial" panose="020B0604020202020204" pitchFamily="34" charset="0"/>
-                <a:ea typeface="Amazon Ember" panose="020B0603020204020204" pitchFamily="34" charset="0"/>
-                <a:cs typeface="Arial" panose="020B0604020202020204" pitchFamily="34" charset="0"/>
-              </a:rPr>
-              <a:t>alarms</a:t>
-            </a:r>
-            <a:endParaRPr lang="en-US" altLang="en-US" sz="1320" dirty="0">
-              <a:latin typeface="Arial" panose="020B0604020202020204" pitchFamily="34" charset="0"/>
-              <a:ea typeface="Amazon Ember" panose="020B0603020204020204" pitchFamily="34" charset="0"/>
-              <a:cs typeface="Arial" panose="020B0604020202020204" pitchFamily="34" charset="0"/>
-            </a:endParaRPr>
           </a:p>
         </p:txBody>
       </p:sp>
@@ -16634,13 +16492,6 @@
               </a:rPr>
               <a:t>CI/CD pipeline</a:t>
             </a:r>
-            <a:endParaRPr lang="en-US" sz="1320" dirty="0">
-              <a:solidFill>
-                <a:srgbClr val="5A6B86"/>
-              </a:solidFill>
-              <a:latin typeface="Arial" panose="020B0604020202020204" pitchFamily="34" charset="0"/>
-              <a:cs typeface="Arial" panose="020B0604020202020204" pitchFamily="34" charset="0"/>
-            </a:endParaRPr>
           </a:p>
         </p:txBody>
       </p:sp>
@@ -16864,11 +16715,6 @@
               </a:rPr>
               <a:t>keys</a:t>
             </a:r>
-            <a:endParaRPr lang="en-US" altLang="en-US" sz="1260" i="1" dirty="0">
-              <a:latin typeface="Arial" panose="020B0604020202020204" pitchFamily="34" charset="0"/>
-              <a:ea typeface="Amazon Ember" panose="020B0603020204020204" pitchFamily="34" charset="0"/>
-              <a:cs typeface="Arial" panose="020B0604020202020204" pitchFamily="34" charset="0"/>
-            </a:endParaRPr>
           </a:p>
         </p:txBody>
       </p:sp>
@@ -22765,25 +22611,8 @@
                 <a:latin typeface="Arial" panose="020B0604020202020204" pitchFamily="34" charset="0"/>
                 <a:cs typeface="Arial" panose="020B0604020202020204" pitchFamily="34" charset="0"/>
               </a:rPr>
-              <a:t>Public </a:t>
+              <a:t>Public subnet 1</a:t>
             </a:r>
-            <a:r>
-              <a:rPr lang="en-US" sz="1440" dirty="0">
-                <a:solidFill>
-                  <a:srgbClr val="1E8900"/>
-                </a:solidFill>
-                <a:latin typeface="Arial" panose="020B0604020202020204" pitchFamily="34" charset="0"/>
-                <a:cs typeface="Arial" panose="020B0604020202020204" pitchFamily="34" charset="0"/>
-              </a:rPr>
-              <a:t>subnet 1</a:t>
-            </a:r>
-            <a:endParaRPr lang="en-US" sz="1440" dirty="0">
-              <a:solidFill>
-                <a:srgbClr val="1E8900"/>
-              </a:solidFill>
-              <a:latin typeface="Arial" panose="020B0604020202020204" pitchFamily="34" charset="0"/>
-              <a:cs typeface="Arial" panose="020B0604020202020204" pitchFamily="34" charset="0"/>
-            </a:endParaRPr>
           </a:p>
         </p:txBody>
       </p:sp>
@@ -22908,17 +22737,7 @@
                 <a:latin typeface="Arial" panose="020B0604020202020204" pitchFamily="34" charset="0"/>
                 <a:cs typeface="Arial" panose="020B0604020202020204" pitchFamily="34" charset="0"/>
               </a:rPr>
-              <a:t>Public </a:t>
-            </a:r>
-            <a:r>
-              <a:rPr lang="en-US" sz="1440" dirty="0">
-                <a:solidFill>
-                  <a:srgbClr val="1E8900"/>
-                </a:solidFill>
-                <a:latin typeface="Arial" panose="020B0604020202020204" pitchFamily="34" charset="0"/>
-                <a:cs typeface="Arial" panose="020B0604020202020204" pitchFamily="34" charset="0"/>
-              </a:rPr>
-              <a:t>subnet 2</a:t>
+              <a:t>Public subnet 2</a:t>
             </a:r>
           </a:p>
         </p:txBody>

</xml_diff>

<commit_message>
Updates per mtg w Dave May
</commit_message>
<xml_diff>
--- a/docs/images/Duo-MFA-architecture.pptx
+++ b/docs/images/Duo-MFA-architecture.pptx
@@ -260,7 +260,7 @@
           <a:p>
             <a:fld id="{6E535ED2-9B9C-684A-B3DF-5A4A64DFB4BE}" type="datetimeFigureOut">
               <a:rPr lang="en-US" smtClean="0"/>
-              <a:t>5/28/2021</a:t>
+              <a:t>6/22/2021</a:t>
             </a:fld>
             <a:endParaRPr lang="en-US" dirty="0"/>
           </a:p>
@@ -430,7 +430,7 @@
           <a:p>
             <a:fld id="{6E535ED2-9B9C-684A-B3DF-5A4A64DFB4BE}" type="datetimeFigureOut">
               <a:rPr lang="en-US" smtClean="0"/>
-              <a:t>5/28/2021</a:t>
+              <a:t>6/22/2021</a:t>
             </a:fld>
             <a:endParaRPr lang="en-US" dirty="0"/>
           </a:p>
@@ -610,7 +610,7 @@
           <a:p>
             <a:fld id="{6E535ED2-9B9C-684A-B3DF-5A4A64DFB4BE}" type="datetimeFigureOut">
               <a:rPr lang="en-US" smtClean="0"/>
-              <a:t>5/28/2021</a:t>
+              <a:t>6/22/2021</a:t>
             </a:fld>
             <a:endParaRPr lang="en-US" dirty="0"/>
           </a:p>
@@ -780,7 +780,7 @@
           <a:p>
             <a:fld id="{6E535ED2-9B9C-684A-B3DF-5A4A64DFB4BE}" type="datetimeFigureOut">
               <a:rPr lang="en-US" smtClean="0"/>
-              <a:t>5/28/2021</a:t>
+              <a:t>6/22/2021</a:t>
             </a:fld>
             <a:endParaRPr lang="en-US" dirty="0"/>
           </a:p>
@@ -1024,7 +1024,7 @@
           <a:p>
             <a:fld id="{6E535ED2-9B9C-684A-B3DF-5A4A64DFB4BE}" type="datetimeFigureOut">
               <a:rPr lang="en-US" smtClean="0"/>
-              <a:t>5/28/2021</a:t>
+              <a:t>6/22/2021</a:t>
             </a:fld>
             <a:endParaRPr lang="en-US" dirty="0"/>
           </a:p>
@@ -1256,7 +1256,7 @@
           <a:p>
             <a:fld id="{6E535ED2-9B9C-684A-B3DF-5A4A64DFB4BE}" type="datetimeFigureOut">
               <a:rPr lang="en-US" smtClean="0"/>
-              <a:t>5/28/2021</a:t>
+              <a:t>6/22/2021</a:t>
             </a:fld>
             <a:endParaRPr lang="en-US" dirty="0"/>
           </a:p>
@@ -1623,7 +1623,7 @@
           <a:p>
             <a:fld id="{6E535ED2-9B9C-684A-B3DF-5A4A64DFB4BE}" type="datetimeFigureOut">
               <a:rPr lang="en-US" smtClean="0"/>
-              <a:t>5/28/2021</a:t>
+              <a:t>6/22/2021</a:t>
             </a:fld>
             <a:endParaRPr lang="en-US" dirty="0"/>
           </a:p>
@@ -1741,7 +1741,7 @@
           <a:p>
             <a:fld id="{6E535ED2-9B9C-684A-B3DF-5A4A64DFB4BE}" type="datetimeFigureOut">
               <a:rPr lang="en-US" smtClean="0"/>
-              <a:t>5/28/2021</a:t>
+              <a:t>6/22/2021</a:t>
             </a:fld>
             <a:endParaRPr lang="en-US" dirty="0"/>
           </a:p>
@@ -1836,7 +1836,7 @@
           <a:p>
             <a:fld id="{6E535ED2-9B9C-684A-B3DF-5A4A64DFB4BE}" type="datetimeFigureOut">
               <a:rPr lang="en-US" smtClean="0"/>
-              <a:t>5/28/2021</a:t>
+              <a:t>6/22/2021</a:t>
             </a:fld>
             <a:endParaRPr lang="en-US" dirty="0"/>
           </a:p>
@@ -2113,7 +2113,7 @@
           <a:p>
             <a:fld id="{6E535ED2-9B9C-684A-B3DF-5A4A64DFB4BE}" type="datetimeFigureOut">
               <a:rPr lang="en-US" smtClean="0"/>
-              <a:t>5/28/2021</a:t>
+              <a:t>6/22/2021</a:t>
             </a:fld>
             <a:endParaRPr lang="en-US" dirty="0"/>
           </a:p>
@@ -2370,7 +2370,7 @@
           <a:p>
             <a:fld id="{6E535ED2-9B9C-684A-B3DF-5A4A64DFB4BE}" type="datetimeFigureOut">
               <a:rPr lang="en-US" smtClean="0"/>
-              <a:t>5/28/2021</a:t>
+              <a:t>6/22/2021</a:t>
             </a:fld>
             <a:endParaRPr lang="en-US" dirty="0"/>
           </a:p>
@@ -2583,7 +2583,7 @@
           <a:p>
             <a:fld id="{6E535ED2-9B9C-684A-B3DF-5A4A64DFB4BE}" type="datetimeFigureOut">
               <a:rPr lang="en-US" smtClean="0"/>
-              <a:t>5/28/2021</a:t>
+              <a:t>6/22/2021</a:t>
             </a:fld>
             <a:endParaRPr lang="en-US" dirty="0"/>
           </a:p>
@@ -3658,7 +3658,7 @@
         </p:blipFill>
         <p:spPr bwMode="auto">
           <a:xfrm>
-            <a:off x="7317883" y="7062037"/>
+            <a:off x="7317883" y="7059782"/>
             <a:ext cx="548640" cy="548640"/>
           </a:xfrm>
           <a:prstGeom prst="rect">
@@ -3705,7 +3705,7 @@
         </p:nvSpPr>
         <p:spPr bwMode="auto">
           <a:xfrm>
-            <a:off x="6685425" y="7577161"/>
+            <a:off x="6685425" y="7574906"/>
             <a:ext cx="1832179" cy="295466"/>
           </a:xfrm>
           <a:prstGeom prst="rect">
@@ -4346,8 +4346,8 @@
         </p:nvSpPr>
         <p:spPr bwMode="auto">
           <a:xfrm>
-            <a:off x="1779271" y="1711202"/>
-            <a:ext cx="1475748" cy="498598"/>
+            <a:off x="1697014" y="1711202"/>
+            <a:ext cx="1655786" cy="498598"/>
           </a:xfrm>
           <a:prstGeom prst="rect">
             <a:avLst/>
@@ -4481,13 +4481,18 @@
           <a:p>
             <a:pPr algn="ctr"/>
             <a:r>
-              <a:rPr lang="en-US" altLang="en-US" sz="1320" dirty="0">
+              <a:rPr lang="en-US" altLang="en-US" sz="1320" dirty="0" smtClean="0">
                 <a:latin typeface="Arial" panose="020B0604020202020204" pitchFamily="34" charset="0"/>
                 <a:ea typeface="Amazon Ember" panose="020B0603020204020204" pitchFamily="34" charset="0"/>
                 <a:cs typeface="Arial" panose="020B0604020202020204" pitchFamily="34" charset="0"/>
               </a:rPr>
-              <a:t>CloudWatch scheduled event</a:t>
+              <a:t>Weekly CloudWatch event</a:t>
             </a:r>
+            <a:endParaRPr lang="en-US" altLang="en-US" sz="1320" dirty="0">
+              <a:latin typeface="Arial" panose="020B0604020202020204" pitchFamily="34" charset="0"/>
+              <a:ea typeface="Amazon Ember" panose="020B0603020204020204" pitchFamily="34" charset="0"/>
+              <a:cs typeface="Arial" panose="020B0604020202020204" pitchFamily="34" charset="0"/>
+            </a:endParaRPr>
           </a:p>
         </p:txBody>
       </p:sp>
@@ -4567,7 +4572,7 @@
         </p:nvSpPr>
         <p:spPr bwMode="auto">
           <a:xfrm>
-            <a:off x="1353025" y="3537485"/>
+            <a:off x="1353025" y="3590734"/>
             <a:ext cx="1244131" cy="295466"/>
           </a:xfrm>
           <a:prstGeom prst="rect">
@@ -4741,7 +4746,7 @@
         </p:blipFill>
         <p:spPr bwMode="auto">
           <a:xfrm>
-            <a:off x="2858093" y="2992063"/>
+            <a:off x="2858093" y="3045312"/>
             <a:ext cx="548640" cy="548640"/>
           </a:xfrm>
           <a:prstGeom prst="rect">
@@ -4788,7 +4793,7 @@
         </p:nvSpPr>
         <p:spPr bwMode="auto">
           <a:xfrm>
-            <a:off x="2490908" y="3537485"/>
+            <a:off x="2490908" y="3590734"/>
             <a:ext cx="1254325" cy="295466"/>
           </a:xfrm>
           <a:prstGeom prst="rect">
@@ -6466,12 +6471,20 @@
               </a:rPr>
             </a:br>
             <a:r>
+              <a:rPr lang="en-US" altLang="en-US" sz="1320" dirty="0" smtClean="0">
+                <a:latin typeface="Arial" panose="020B0604020202020204" pitchFamily="34" charset="0"/>
+                <a:ea typeface="Amazon Ember" panose="020B0603020204020204" pitchFamily="34" charset="0"/>
+                <a:cs typeface="Arial" panose="020B0604020202020204" pitchFamily="34" charset="0"/>
+              </a:rPr>
+              <a:t>function 1:</a:t>
+            </a:r>
+            <a:r>
               <a:rPr lang="en-US" altLang="en-US" sz="1320" dirty="0">
                 <a:latin typeface="Arial" panose="020B0604020202020204" pitchFamily="34" charset="0"/>
                 <a:ea typeface="Amazon Ember" panose="020B0603020204020204" pitchFamily="34" charset="0"/>
                 <a:cs typeface="Arial" panose="020B0604020202020204" pitchFamily="34" charset="0"/>
               </a:rPr>
-              <a:t>function:</a:t>
+              <a:t/>
             </a:r>
             <a:br>
               <a:rPr lang="en-US" altLang="en-US" sz="1320" dirty="0">
@@ -6670,7 +6683,23 @@
                 <a:ea typeface="Amazon Ember" panose="020B0603020204020204" pitchFamily="34" charset="0"/>
                 <a:cs typeface="Arial" panose="020B0604020202020204" pitchFamily="34" charset="0"/>
               </a:rPr>
-              <a:t>Lambda function:</a:t>
+              <a:t>Lambda </a:t>
+            </a:r>
+            <a:r>
+              <a:rPr lang="en-US" altLang="en-US" sz="1320" dirty="0" smtClean="0">
+                <a:latin typeface="Arial" panose="020B0604020202020204" pitchFamily="34" charset="0"/>
+                <a:ea typeface="Amazon Ember" panose="020B0603020204020204" pitchFamily="34" charset="0"/>
+                <a:cs typeface="Arial" panose="020B0604020202020204" pitchFamily="34" charset="0"/>
+              </a:rPr>
+              <a:t>function 2:</a:t>
+            </a:r>
+            <a:r>
+              <a:rPr lang="en-US" altLang="en-US" sz="1320" dirty="0">
+                <a:latin typeface="Arial" panose="020B0604020202020204" pitchFamily="34" charset="0"/>
+                <a:ea typeface="Amazon Ember" panose="020B0603020204020204" pitchFamily="34" charset="0"/>
+                <a:cs typeface="Arial" panose="020B0604020202020204" pitchFamily="34" charset="0"/>
+              </a:rPr>
+              <a:t/>
             </a:r>
             <a:br>
               <a:rPr lang="en-US" altLang="en-US" sz="1320" dirty="0">
@@ -6706,8 +6735,8 @@
         </p:nvSpPr>
         <p:spPr bwMode="auto">
           <a:xfrm>
-            <a:off x="11833103" y="2297698"/>
-            <a:ext cx="1425697" cy="904863"/>
+            <a:off x="11811000" y="2297698"/>
+            <a:ext cx="1614416" cy="701731"/>
           </a:xfrm>
           <a:prstGeom prst="rect">
             <a:avLst/>
@@ -6846,7 +6875,38 @@
                 <a:ea typeface="Amazon Ember" panose="020B0603020204020204" pitchFamily="34" charset="0"/>
                 <a:cs typeface="Arial" panose="020B0604020202020204" pitchFamily="34" charset="0"/>
               </a:rPr>
-              <a:t>Lambda function:</a:t>
+              <a:t>Lambda </a:t>
+            </a:r>
+            <a:r>
+              <a:rPr lang="en-US" altLang="en-US" sz="1320" dirty="0" smtClean="0">
+                <a:latin typeface="Arial" panose="020B0604020202020204" pitchFamily="34" charset="0"/>
+                <a:ea typeface="Amazon Ember" panose="020B0603020204020204" pitchFamily="34" charset="0"/>
+                <a:cs typeface="Arial" panose="020B0604020202020204" pitchFamily="34" charset="0"/>
+              </a:rPr>
+              <a:t/>
+            </a:r>
+            <a:br>
+              <a:rPr lang="en-US" altLang="en-US" sz="1320" dirty="0" smtClean="0">
+                <a:latin typeface="Arial" panose="020B0604020202020204" pitchFamily="34" charset="0"/>
+                <a:ea typeface="Amazon Ember" panose="020B0603020204020204" pitchFamily="34" charset="0"/>
+                <a:cs typeface="Arial" panose="020B0604020202020204" pitchFamily="34" charset="0"/>
+              </a:rPr>
+            </a:br>
+            <a:r>
+              <a:rPr lang="en-US" altLang="en-US" sz="1320" dirty="0" smtClean="0">
+                <a:latin typeface="Arial" panose="020B0604020202020204" pitchFamily="34" charset="0"/>
+                <a:ea typeface="Amazon Ember" panose="020B0603020204020204" pitchFamily="34" charset="0"/>
+                <a:cs typeface="Arial" panose="020B0604020202020204" pitchFamily="34" charset="0"/>
+              </a:rPr>
+              <a:t>function 3:</a:t>
+            </a:r>
+            <a:r>
+              <a:rPr lang="en-US" altLang="en-US" sz="1320" dirty="0">
+                <a:latin typeface="Arial" panose="020B0604020202020204" pitchFamily="34" charset="0"/>
+                <a:ea typeface="Amazon Ember" panose="020B0603020204020204" pitchFamily="34" charset="0"/>
+                <a:cs typeface="Arial" panose="020B0604020202020204" pitchFamily="34" charset="0"/>
+              </a:rPr>
+              <a:t/>
             </a:r>
             <a:br>
               <a:rPr lang="en-US" altLang="en-US" sz="1320" dirty="0">
@@ -6863,21 +6923,19 @@
               </a:rPr>
               <a:t>Update or </a:t>
             </a:r>
-            <a:br>
-              <a:rPr lang="en-US" altLang="en-US" sz="1320" dirty="0">
-                <a:latin typeface="Arial" panose="020B0604020202020204" pitchFamily="34" charset="0"/>
-                <a:ea typeface="Amazon Ember" panose="020B0603020204020204" pitchFamily="34" charset="0"/>
-                <a:cs typeface="Arial" panose="020B0604020202020204" pitchFamily="34" charset="0"/>
-              </a:rPr>
-            </a:br>
             <a:r>
-              <a:rPr lang="en-US" altLang="en-US" sz="1320" dirty="0">
+              <a:rPr lang="en-US" altLang="en-US" sz="1320" dirty="0" smtClean="0">
                 <a:latin typeface="Arial" panose="020B0604020202020204" pitchFamily="34" charset="0"/>
                 <a:ea typeface="Amazon Ember" panose="020B0603020204020204" pitchFamily="34" charset="0"/>
                 <a:cs typeface="Arial" panose="020B0604020202020204" pitchFamily="34" charset="0"/>
               </a:rPr>
               <a:t>notify</a:t>
             </a:r>
+            <a:endParaRPr lang="en-US" altLang="en-US" sz="1320" dirty="0">
+              <a:latin typeface="Arial" panose="020B0604020202020204" pitchFamily="34" charset="0"/>
+              <a:ea typeface="Amazon Ember" panose="020B0603020204020204" pitchFamily="34" charset="0"/>
+              <a:cs typeface="Arial" panose="020B0604020202020204" pitchFamily="34" charset="0"/>
+            </a:endParaRPr>
           </a:p>
         </p:txBody>
       </p:sp>
@@ -6910,7 +6968,7 @@
         </p:blipFill>
         <p:spPr bwMode="auto">
           <a:xfrm>
-            <a:off x="1702045" y="2997683"/>
+            <a:off x="1702045" y="3050932"/>
             <a:ext cx="548640" cy="548640"/>
           </a:xfrm>
           <a:prstGeom prst="rect">
@@ -6959,12 +7017,12 @@
         </p:nvCxnSpPr>
         <p:spPr>
           <a:xfrm rot="5400000" flipH="1" flipV="1">
-            <a:off x="1852814" y="2333352"/>
-            <a:ext cx="787883" cy="540780"/>
+            <a:off x="1830070" y="2356095"/>
+            <a:ext cx="841132" cy="548542"/>
           </a:xfrm>
           <a:prstGeom prst="bentConnector3">
             <a:avLst>
-              <a:gd name="adj1" fmla="val 85059"/>
+              <a:gd name="adj1" fmla="val 80575"/>
             </a:avLst>
           </a:prstGeom>
           <a:ln w="12700">
@@ -7055,8 +7113,8 @@
         </p:nvCxnSpPr>
         <p:spPr>
           <a:xfrm flipV="1">
-            <a:off x="3810900" y="7336357"/>
-            <a:ext cx="3506983" cy="9549"/>
+            <a:off x="3810900" y="7334102"/>
+            <a:ext cx="3506983" cy="0"/>
           </a:xfrm>
           <a:prstGeom prst="straightConnector1">
             <a:avLst/>
@@ -7291,7 +7349,7 @@
         <p:spPr>
           <a:xfrm flipH="1" flipV="1">
             <a:off x="11689987" y="2038389"/>
-            <a:ext cx="581644" cy="1745"/>
+            <a:ext cx="621910" cy="1745"/>
           </a:xfrm>
           <a:prstGeom prst="straightConnector1">
             <a:avLst/>
@@ -7810,8 +7868,8 @@
         </p:nvCxnSpPr>
         <p:spPr>
           <a:xfrm rot="16200000" flipV="1">
-            <a:off x="12453826" y="3294688"/>
-            <a:ext cx="627663" cy="443410"/>
+            <a:off x="12388388" y="3229250"/>
+            <a:ext cx="830795" cy="371154"/>
           </a:xfrm>
           <a:prstGeom prst="bentConnector3">
             <a:avLst>
@@ -7997,23 +8055,7 @@
                 <a:ea typeface="Amazon Ember" panose="020B0603020204020204" pitchFamily="34" charset="0"/>
                 <a:cs typeface="Arial" panose="020B0604020202020204" pitchFamily="34" charset="0"/>
               </a:rPr>
-              <a:t>CloudWatch </a:t>
-            </a:r>
-            <a:r>
-              <a:rPr lang="en-US" altLang="en-US" sz="1320" dirty="0">
-                <a:latin typeface="Arial" panose="020B0604020202020204" pitchFamily="34" charset="0"/>
-                <a:ea typeface="Amazon Ember" panose="020B0603020204020204" pitchFamily="34" charset="0"/>
-                <a:cs typeface="Arial" panose="020B0604020202020204" pitchFamily="34" charset="0"/>
-              </a:rPr>
-              <a:t>alarms</a:t>
-            </a:r>
-            <a:r>
-              <a:rPr lang="en-US" altLang="en-US" sz="1320" dirty="0">
-                <a:latin typeface="Arial" panose="020B0604020202020204" pitchFamily="34" charset="0"/>
-                <a:ea typeface="Amazon Ember" panose="020B0603020204020204" pitchFamily="34" charset="0"/>
-                <a:cs typeface="Arial" panose="020B0604020202020204" pitchFamily="34" charset="0"/>
-              </a:rPr>
-              <a:t/>
+              <a:t>CloudWatch alarms</a:t>
             </a:r>
             <a:br>
               <a:rPr lang="en-US" altLang="en-US" sz="1320" dirty="0">
@@ -8225,7 +8267,7 @@
         <p:spPr>
           <a:xfrm flipV="1">
             <a:off x="7784008" y="2796295"/>
-            <a:ext cx="0" cy="4265742"/>
+            <a:ext cx="0" cy="3727744"/>
           </a:xfrm>
           <a:prstGeom prst="straightConnector1">
             <a:avLst/>
@@ -8271,8 +8313,8 @@
         </p:nvCxnSpPr>
         <p:spPr>
           <a:xfrm rot="5400000" flipH="1" flipV="1">
-            <a:off x="12006481" y="3286527"/>
-            <a:ext cx="623437" cy="455506"/>
+            <a:off x="11941043" y="3148833"/>
+            <a:ext cx="826569" cy="527762"/>
           </a:xfrm>
           <a:prstGeom prst="bentConnector3">
             <a:avLst>
@@ -8451,7 +8493,7 @@
         </p:blipFill>
         <p:spPr bwMode="auto">
           <a:xfrm>
-            <a:off x="12271631" y="1765814"/>
+            <a:off x="12311897" y="1765814"/>
             <a:ext cx="548640" cy="548640"/>
           </a:xfrm>
           <a:prstGeom prst="rect">
@@ -8731,11 +8773,6 @@
               </a:rPr>
               <a:t>SNS notification</a:t>
             </a:r>
-            <a:endParaRPr lang="en-US" altLang="en-US" sz="1320" dirty="0">
-              <a:latin typeface="Arial" panose="020B0604020202020204" pitchFamily="34" charset="0"/>
-              <a:ea typeface="Amazon Ember" panose="020B0603020204020204" pitchFamily="34" charset="0"/>
-              <a:cs typeface="Arial" panose="020B0604020202020204" pitchFamily="34" charset="0"/>
-            </a:endParaRPr>
           </a:p>
         </p:txBody>
       </p:sp>
@@ -9289,8 +9326,8 @@
         </p:nvSpPr>
         <p:spPr>
           <a:xfrm>
-            <a:off x="1619750" y="2508861"/>
-            <a:ext cx="1823969" cy="262914"/>
+            <a:off x="1619750" y="2594189"/>
+            <a:ext cx="1823969" cy="275734"/>
           </a:xfrm>
           <a:prstGeom prst="rect">
             <a:avLst/>
@@ -9341,8 +9378,8 @@
         </p:nvSpPr>
         <p:spPr>
           <a:xfrm>
-            <a:off x="1373458" y="2434073"/>
-            <a:ext cx="2302620" cy="3947198"/>
+            <a:off x="1373458" y="2523842"/>
+            <a:ext cx="2302620" cy="3857429"/>
           </a:xfrm>
           <a:prstGeom prst="rect">
             <a:avLst/>
@@ -9379,7 +9416,7 @@
               <a:defRPr/>
             </a:pPr>
             <a:r>
-              <a:rPr lang="en-US" sz="1320" dirty="0">
+              <a:rPr lang="en-US" sz="1320" dirty="0" smtClean="0">
                 <a:solidFill>
                   <a:srgbClr val="5A6B86"/>
                 </a:solidFill>
@@ -9388,6 +9425,13 @@
               </a:rPr>
               <a:t>Image deployment</a:t>
             </a:r>
+            <a:endParaRPr lang="en-US" sz="1320" dirty="0">
+              <a:solidFill>
+                <a:srgbClr val="5A6B86"/>
+              </a:solidFill>
+              <a:latin typeface="Arial" panose="020B0604020202020204" pitchFamily="34" charset="0"/>
+              <a:cs typeface="Arial" panose="020B0604020202020204" pitchFamily="34" charset="0"/>
+            </a:endParaRPr>
           </a:p>
         </p:txBody>
       </p:sp>
@@ -9805,12 +9849,12 @@
         </p:nvCxnSpPr>
         <p:spPr>
           <a:xfrm rot="16200000" flipH="1">
-            <a:off x="5103617" y="4721559"/>
-            <a:ext cx="3859476" cy="821483"/>
+            <a:off x="5326980" y="4498197"/>
+            <a:ext cx="3321476" cy="730208"/>
           </a:xfrm>
           <a:prstGeom prst="bentConnector3">
             <a:avLst>
-              <a:gd name="adj1" fmla="val 10266"/>
+              <a:gd name="adj1" fmla="val 13007"/>
             </a:avLst>
           </a:prstGeom>
           <a:ln w="12700">
@@ -9896,52 +9940,6 @@
           </a:extLst>
         </p:spPr>
       </p:pic>
-      <p:sp>
-        <p:nvSpPr>
-          <p:cNvPr id="2" name="Rectangle 1"/>
-          <p:cNvSpPr/>
-          <p:nvPr/>
-        </p:nvSpPr>
-        <p:spPr>
-          <a:xfrm>
-            <a:off x="6823958" y="6678357"/>
-            <a:ext cx="1602857" cy="238030"/>
-          </a:xfrm>
-          <a:prstGeom prst="rect">
-            <a:avLst/>
-          </a:prstGeom>
-          <a:solidFill>
-            <a:schemeClr val="bg1"/>
-          </a:solidFill>
-          <a:ln>
-            <a:noFill/>
-          </a:ln>
-        </p:spPr>
-        <p:style>
-          <a:lnRef idx="2">
-            <a:schemeClr val="accent1">
-              <a:shade val="50000"/>
-            </a:schemeClr>
-          </a:lnRef>
-          <a:fillRef idx="1">
-            <a:schemeClr val="accent1"/>
-          </a:fillRef>
-          <a:effectRef idx="0">
-            <a:schemeClr val="accent1"/>
-          </a:effectRef>
-          <a:fontRef idx="minor">
-            <a:schemeClr val="lt1"/>
-          </a:fontRef>
-        </p:style>
-        <p:txBody>
-          <a:bodyPr rtlCol="0" anchor="ctr"/>
-          <a:lstStyle/>
-          <a:p>
-            <a:pPr algn="ctr"/>
-            <a:endParaRPr lang="en-US" sz="2592" dirty="0"/>
-          </a:p>
-        </p:txBody>
-      </p:sp>
       <p:cxnSp>
         <p:nvCxnSpPr>
           <p:cNvPr id="128" name="Elbow Connector 60">
@@ -10054,8 +10052,8 @@
         </p:nvCxnSpPr>
         <p:spPr>
           <a:xfrm flipH="1" flipV="1">
-            <a:off x="1975091" y="3832951"/>
-            <a:ext cx="1275" cy="338436"/>
+            <a:off x="1975091" y="3886200"/>
+            <a:ext cx="1274" cy="285187"/>
           </a:xfrm>
           <a:prstGeom prst="straightConnector1">
             <a:avLst/>
@@ -10101,7 +10099,7 @@
         </p:nvCxnSpPr>
         <p:spPr>
           <a:xfrm flipV="1">
-            <a:off x="2250687" y="3266384"/>
+            <a:off x="2250687" y="3319633"/>
             <a:ext cx="607408" cy="5620"/>
           </a:xfrm>
           <a:prstGeom prst="straightConnector1">
@@ -10196,7 +10194,7 @@
       </p:sp>
       <p:sp>
         <p:nvSpPr>
-          <p:cNvPr id="87" name="Rectangle 86">
+          <p:cNvPr id="104" name="Rectangle 103">
             <a:extLst>
               <a:ext uri="{FF2B5EF4-FFF2-40B4-BE49-F238E27FC236}">
                 <a16:creationId xmlns:a16="http://schemas.microsoft.com/office/drawing/2014/main" id="{FFA89DF7-D079-0947-8E29-4EEA4975DBBD}"/>
@@ -10208,8 +10206,8 @@
         </p:nvSpPr>
         <p:spPr>
           <a:xfrm>
-            <a:off x="5638285" y="6573878"/>
-            <a:ext cx="4064087" cy="1341763"/>
+            <a:off x="5585620" y="6524039"/>
+            <a:ext cx="4055623" cy="1391602"/>
           </a:xfrm>
           <a:prstGeom prst="rect">
             <a:avLst/>
@@ -10253,288 +10251,13 @@
                 <a:latin typeface="Arial" panose="020B0604020202020204" pitchFamily="34" charset="0"/>
                 <a:cs typeface="Arial" panose="020B0604020202020204" pitchFamily="34" charset="0"/>
               </a:rPr>
-              <a:t>Serverless </a:t>
-            </a:r>
-            <a:r>
-              <a:rPr lang="en-US" sz="1320" dirty="0">
-                <a:solidFill>
-                  <a:srgbClr val="5A6B86"/>
-                </a:solidFill>
-                <a:latin typeface="Arial" panose="020B0604020202020204" pitchFamily="34" charset="0"/>
-                <a:cs typeface="Arial" panose="020B0604020202020204" pitchFamily="34" charset="0"/>
-              </a:rPr>
-              <a:t>managed </a:t>
-            </a:r>
-            <a:r>
-              <a:rPr lang="en-US" sz="1320" dirty="0" smtClean="0">
-                <a:solidFill>
-                  <a:srgbClr val="5A6B86"/>
-                </a:solidFill>
-                <a:latin typeface="Arial" panose="020B0604020202020204" pitchFamily="34" charset="0"/>
-                <a:cs typeface="Arial" panose="020B0604020202020204" pitchFamily="34" charset="0"/>
-              </a:rPr>
-              <a:t>Fargate </a:t>
-            </a:r>
-            <a:r>
-              <a:rPr lang="en-US" sz="1320" dirty="0">
-                <a:solidFill>
-                  <a:srgbClr val="5A6B86"/>
-                </a:solidFill>
-                <a:latin typeface="Arial" panose="020B0604020202020204" pitchFamily="34" charset="0"/>
-                <a:cs typeface="Arial" panose="020B0604020202020204" pitchFamily="34" charset="0"/>
-              </a:rPr>
-              <a:t>cluster</a:t>
-            </a:r>
-            <a:r>
-              <a:rPr lang="en-US" sz="1320" dirty="0" smtClean="0">
-                <a:solidFill>
-                  <a:srgbClr val="5A6B86"/>
-                </a:solidFill>
-                <a:latin typeface="Arial" panose="020B0604020202020204" pitchFamily="34" charset="0"/>
-                <a:cs typeface="Arial" panose="020B0604020202020204" pitchFamily="34" charset="0"/>
-              </a:rPr>
-              <a:t> </a:t>
+              <a:t>Serverless managed Fargate cluster</a:t>
             </a:r>
             <a:endParaRPr lang="en-US" sz="1320" dirty="0">
               <a:solidFill>
                 <a:srgbClr val="5A6B86"/>
               </a:solidFill>
               <a:latin typeface="Arial" panose="020B0604020202020204" pitchFamily="34" charset="0"/>
-              <a:cs typeface="Arial" panose="020B0604020202020204" pitchFamily="34" charset="0"/>
-            </a:endParaRPr>
-          </a:p>
-        </p:txBody>
-      </p:sp>
-      <p:sp>
-        <p:nvSpPr>
-          <p:cNvPr id="99" name="Rectangle 98">
-            <a:extLst>
-              <a:ext uri="{FF2B5EF4-FFF2-40B4-BE49-F238E27FC236}">
-                <a16:creationId xmlns:a16="http://schemas.microsoft.com/office/drawing/2014/main" id="{3E67FA2E-A9FA-844D-A66D-648AE8044B50}"/>
-              </a:ext>
-            </a:extLst>
-          </p:cNvPr>
-          <p:cNvSpPr/>
-          <p:nvPr/>
-        </p:nvSpPr>
-        <p:spPr>
-          <a:xfrm>
-            <a:off x="5652755" y="8534400"/>
-            <a:ext cx="4049617" cy="1341660"/>
-          </a:xfrm>
-          <a:prstGeom prst="rect">
-            <a:avLst/>
-          </a:prstGeom>
-          <a:noFill/>
-          <a:ln w="12700">
-            <a:solidFill>
-              <a:srgbClr val="DF3312"/>
-            </a:solidFill>
-          </a:ln>
-        </p:spPr>
-        <p:style>
-          <a:lnRef idx="2">
-            <a:schemeClr val="accent1">
-              <a:shade val="50000"/>
-            </a:schemeClr>
-          </a:lnRef>
-          <a:fillRef idx="1">
-            <a:schemeClr val="accent1"/>
-          </a:fillRef>
-          <a:effectRef idx="0">
-            <a:schemeClr val="accent1"/>
-          </a:effectRef>
-          <a:fontRef idx="minor">
-            <a:schemeClr val="lt1"/>
-          </a:fontRef>
-        </p:style>
-        <p:txBody>
-          <a:bodyPr tIns="91440" anchorCtr="1"/>
-          <a:lstStyle/>
-          <a:p>
-            <a:pPr eaLnBrk="1" fontAlgn="auto" hangingPunct="1">
-              <a:spcBef>
-                <a:spcPts val="0"/>
-              </a:spcBef>
-              <a:spcAft>
-                <a:spcPts val="0"/>
-              </a:spcAft>
-              <a:defRPr/>
-            </a:pPr>
-            <a:r>
-              <a:rPr lang="en-US" sz="1320" dirty="0">
-                <a:solidFill>
-                  <a:srgbClr val="DF3312"/>
-                </a:solidFill>
-                <a:latin typeface="Arial" panose="020B0604020202020204" pitchFamily="34" charset="0"/>
-                <a:cs typeface="Arial" panose="020B0604020202020204" pitchFamily="34" charset="0"/>
-              </a:rPr>
-              <a:t>Security group</a:t>
-            </a:r>
-          </a:p>
-        </p:txBody>
-      </p:sp>
-      <p:sp>
-        <p:nvSpPr>
-          <p:cNvPr id="103" name="TextBox 16">
-            <a:extLst>
-              <a:ext uri="{FF2B5EF4-FFF2-40B4-BE49-F238E27FC236}">
-                <a16:creationId xmlns:a16="http://schemas.microsoft.com/office/drawing/2014/main" id="{B30F4969-F73B-2145-B92C-809596CF1489}"/>
-              </a:ext>
-            </a:extLst>
-          </p:cNvPr>
-          <p:cNvSpPr txBox="1">
-            <a:spLocks noChangeArrowheads="1"/>
-          </p:cNvSpPr>
-          <p:nvPr/>
-        </p:nvSpPr>
-        <p:spPr bwMode="auto">
-          <a:xfrm>
-            <a:off x="6349182" y="8589182"/>
-            <a:ext cx="684173" cy="295466"/>
-          </a:xfrm>
-          <a:prstGeom prst="rect">
-            <a:avLst/>
-          </a:prstGeom>
-          <a:noFill/>
-          <a:ln>
-            <a:noFill/>
-          </a:ln>
-          <a:extLst>
-            <a:ext uri="{909E8E84-426E-40DD-AFC4-6F175D3DCCD1}">
-              <a14:hiddenFill xmlns:a14="http://schemas.microsoft.com/office/drawing/2010/main">
-                <a:solidFill>
-                  <a:srgbClr val="FFFFFF"/>
-                </a:solidFill>
-              </a14:hiddenFill>
-            </a:ext>
-            <a:ext uri="{91240B29-F687-4F45-9708-019B960494DF}">
-              <a14:hiddenLine xmlns:a14="http://schemas.microsoft.com/office/drawing/2010/main" w="9525">
-                <a:solidFill>
-                  <a:srgbClr val="000000"/>
-                </a:solidFill>
-                <a:miter lim="800000"/>
-                <a:headEnd/>
-                <a:tailEnd/>
-              </a14:hiddenLine>
-            </a:ext>
-          </a:extLst>
-        </p:spPr>
-        <p:txBody>
-          <a:bodyPr wrap="square">
-            <a:spAutoFit/>
-          </a:bodyPr>
-          <a:lstStyle>
-            <a:lvl1pPr>
-              <a:defRPr>
-                <a:solidFill>
-                  <a:schemeClr val="tx1"/>
-                </a:solidFill>
-                <a:latin typeface="Calibri" panose="020F0502020204030204" pitchFamily="34" charset="0"/>
-              </a:defRPr>
-            </a:lvl1pPr>
-            <a:lvl2pPr marL="742950" indent="-285750">
-              <a:defRPr>
-                <a:solidFill>
-                  <a:schemeClr val="tx1"/>
-                </a:solidFill>
-                <a:latin typeface="Calibri" panose="020F0502020204030204" pitchFamily="34" charset="0"/>
-              </a:defRPr>
-            </a:lvl2pPr>
-            <a:lvl3pPr marL="1143000" indent="-228600">
-              <a:defRPr>
-                <a:solidFill>
-                  <a:schemeClr val="tx1"/>
-                </a:solidFill>
-                <a:latin typeface="Calibri" panose="020F0502020204030204" pitchFamily="34" charset="0"/>
-              </a:defRPr>
-            </a:lvl3pPr>
-            <a:lvl4pPr marL="1600200" indent="-228600">
-              <a:defRPr>
-                <a:solidFill>
-                  <a:schemeClr val="tx1"/>
-                </a:solidFill>
-                <a:latin typeface="Calibri" panose="020F0502020204030204" pitchFamily="34" charset="0"/>
-              </a:defRPr>
-            </a:lvl4pPr>
-            <a:lvl5pPr marL="2057400" indent="-228600">
-              <a:defRPr>
-                <a:solidFill>
-                  <a:schemeClr val="tx1"/>
-                </a:solidFill>
-                <a:latin typeface="Calibri" panose="020F0502020204030204" pitchFamily="34" charset="0"/>
-              </a:defRPr>
-            </a:lvl5pPr>
-            <a:lvl6pPr marL="2514600" indent="-228600" eaLnBrk="0" fontAlgn="base" hangingPunct="0">
-              <a:spcBef>
-                <a:spcPct val="0"/>
-              </a:spcBef>
-              <a:spcAft>
-                <a:spcPct val="0"/>
-              </a:spcAft>
-              <a:defRPr>
-                <a:solidFill>
-                  <a:schemeClr val="tx1"/>
-                </a:solidFill>
-                <a:latin typeface="Calibri" panose="020F0502020204030204" pitchFamily="34" charset="0"/>
-              </a:defRPr>
-            </a:lvl6pPr>
-            <a:lvl7pPr marL="2971800" indent="-228600" eaLnBrk="0" fontAlgn="base" hangingPunct="0">
-              <a:spcBef>
-                <a:spcPct val="0"/>
-              </a:spcBef>
-              <a:spcAft>
-                <a:spcPct val="0"/>
-              </a:spcAft>
-              <a:defRPr>
-                <a:solidFill>
-                  <a:schemeClr val="tx1"/>
-                </a:solidFill>
-                <a:latin typeface="Calibri" panose="020F0502020204030204" pitchFamily="34" charset="0"/>
-              </a:defRPr>
-            </a:lvl7pPr>
-            <a:lvl8pPr marL="3429000" indent="-228600" eaLnBrk="0" fontAlgn="base" hangingPunct="0">
-              <a:spcBef>
-                <a:spcPct val="0"/>
-              </a:spcBef>
-              <a:spcAft>
-                <a:spcPct val="0"/>
-              </a:spcAft>
-              <a:defRPr>
-                <a:solidFill>
-                  <a:schemeClr val="tx1"/>
-                </a:solidFill>
-                <a:latin typeface="Calibri" panose="020F0502020204030204" pitchFamily="34" charset="0"/>
-              </a:defRPr>
-            </a:lvl8pPr>
-            <a:lvl9pPr marL="3886200" indent="-228600" eaLnBrk="0" fontAlgn="base" hangingPunct="0">
-              <a:spcBef>
-                <a:spcPct val="0"/>
-              </a:spcBef>
-              <a:spcAft>
-                <a:spcPct val="0"/>
-              </a:spcAft>
-              <a:defRPr>
-                <a:solidFill>
-                  <a:schemeClr val="tx1"/>
-                </a:solidFill>
-                <a:latin typeface="Calibri" panose="020F0502020204030204" pitchFamily="34" charset="0"/>
-              </a:defRPr>
-            </a:lvl9pPr>
-          </a:lstStyle>
-          <a:p>
-            <a:pPr algn="ctr"/>
-            <a:r>
-              <a:rPr lang="en-US" altLang="en-US" sz="1320" dirty="0" smtClean="0">
-                <a:latin typeface="Arial" panose="020B0604020202020204" pitchFamily="34" charset="0"/>
-                <a:ea typeface="Amazon Ember" panose="020B0603020204020204" pitchFamily="34" charset="0"/>
-                <a:cs typeface="Arial" panose="020B0604020202020204" pitchFamily="34" charset="0"/>
-              </a:rPr>
-              <a:t>or…?</a:t>
-            </a:r>
-            <a:endParaRPr lang="en-US" altLang="en-US" sz="1320" dirty="0">
-              <a:latin typeface="Arial" panose="020B0604020202020204" pitchFamily="34" charset="0"/>
-              <a:ea typeface="Amazon Ember" panose="020B0603020204020204" pitchFamily="34" charset="0"/>
               <a:cs typeface="Arial" panose="020B0604020202020204" pitchFamily="34" charset="0"/>
             </a:endParaRPr>
           </a:p>

</xml_diff>

<commit_message>
Updated various files per Daniel's landing-page feedback
</commit_message>
<xml_diff>
--- a/docs/images/Duo-MFA-architecture.pptx
+++ b/docs/images/Duo-MFA-architecture.pptx
@@ -260,7 +260,7 @@
           <a:p>
             <a:fld id="{6E535ED2-9B9C-684A-B3DF-5A4A64DFB4BE}" type="datetimeFigureOut">
               <a:rPr lang="en-US" smtClean="0"/>
-              <a:t>6/22/2021</a:t>
+              <a:t>6/23/2021</a:t>
             </a:fld>
             <a:endParaRPr lang="en-US" dirty="0"/>
           </a:p>
@@ -430,7 +430,7 @@
           <a:p>
             <a:fld id="{6E535ED2-9B9C-684A-B3DF-5A4A64DFB4BE}" type="datetimeFigureOut">
               <a:rPr lang="en-US" smtClean="0"/>
-              <a:t>6/22/2021</a:t>
+              <a:t>6/23/2021</a:t>
             </a:fld>
             <a:endParaRPr lang="en-US" dirty="0"/>
           </a:p>
@@ -610,7 +610,7 @@
           <a:p>
             <a:fld id="{6E535ED2-9B9C-684A-B3DF-5A4A64DFB4BE}" type="datetimeFigureOut">
               <a:rPr lang="en-US" smtClean="0"/>
-              <a:t>6/22/2021</a:t>
+              <a:t>6/23/2021</a:t>
             </a:fld>
             <a:endParaRPr lang="en-US" dirty="0"/>
           </a:p>
@@ -780,7 +780,7 @@
           <a:p>
             <a:fld id="{6E535ED2-9B9C-684A-B3DF-5A4A64DFB4BE}" type="datetimeFigureOut">
               <a:rPr lang="en-US" smtClean="0"/>
-              <a:t>6/22/2021</a:t>
+              <a:t>6/23/2021</a:t>
             </a:fld>
             <a:endParaRPr lang="en-US" dirty="0"/>
           </a:p>
@@ -1024,7 +1024,7 @@
           <a:p>
             <a:fld id="{6E535ED2-9B9C-684A-B3DF-5A4A64DFB4BE}" type="datetimeFigureOut">
               <a:rPr lang="en-US" smtClean="0"/>
-              <a:t>6/22/2021</a:t>
+              <a:t>6/23/2021</a:t>
             </a:fld>
             <a:endParaRPr lang="en-US" dirty="0"/>
           </a:p>
@@ -1256,7 +1256,7 @@
           <a:p>
             <a:fld id="{6E535ED2-9B9C-684A-B3DF-5A4A64DFB4BE}" type="datetimeFigureOut">
               <a:rPr lang="en-US" smtClean="0"/>
-              <a:t>6/22/2021</a:t>
+              <a:t>6/23/2021</a:t>
             </a:fld>
             <a:endParaRPr lang="en-US" dirty="0"/>
           </a:p>
@@ -1623,7 +1623,7 @@
           <a:p>
             <a:fld id="{6E535ED2-9B9C-684A-B3DF-5A4A64DFB4BE}" type="datetimeFigureOut">
               <a:rPr lang="en-US" smtClean="0"/>
-              <a:t>6/22/2021</a:t>
+              <a:t>6/23/2021</a:t>
             </a:fld>
             <a:endParaRPr lang="en-US" dirty="0"/>
           </a:p>
@@ -1741,7 +1741,7 @@
           <a:p>
             <a:fld id="{6E535ED2-9B9C-684A-B3DF-5A4A64DFB4BE}" type="datetimeFigureOut">
               <a:rPr lang="en-US" smtClean="0"/>
-              <a:t>6/22/2021</a:t>
+              <a:t>6/23/2021</a:t>
             </a:fld>
             <a:endParaRPr lang="en-US" dirty="0"/>
           </a:p>
@@ -1836,7 +1836,7 @@
           <a:p>
             <a:fld id="{6E535ED2-9B9C-684A-B3DF-5A4A64DFB4BE}" type="datetimeFigureOut">
               <a:rPr lang="en-US" smtClean="0"/>
-              <a:t>6/22/2021</a:t>
+              <a:t>6/23/2021</a:t>
             </a:fld>
             <a:endParaRPr lang="en-US" dirty="0"/>
           </a:p>
@@ -2113,7 +2113,7 @@
           <a:p>
             <a:fld id="{6E535ED2-9B9C-684A-B3DF-5A4A64DFB4BE}" type="datetimeFigureOut">
               <a:rPr lang="en-US" smtClean="0"/>
-              <a:t>6/22/2021</a:t>
+              <a:t>6/23/2021</a:t>
             </a:fld>
             <a:endParaRPr lang="en-US" dirty="0"/>
           </a:p>
@@ -2370,7 +2370,7 @@
           <a:p>
             <a:fld id="{6E535ED2-9B9C-684A-B3DF-5A4A64DFB4BE}" type="datetimeFigureOut">
               <a:rPr lang="en-US" smtClean="0"/>
-              <a:t>6/22/2021</a:t>
+              <a:t>6/23/2021</a:t>
             </a:fld>
             <a:endParaRPr lang="en-US" dirty="0"/>
           </a:p>
@@ -2583,7 +2583,7 @@
           <a:p>
             <a:fld id="{6E535ED2-9B9C-684A-B3DF-5A4A64DFB4BE}" type="datetimeFigureOut">
               <a:rPr lang="en-US" smtClean="0"/>
-              <a:t>6/22/2021</a:t>
+              <a:t>6/23/2021</a:t>
             </a:fld>
             <a:endParaRPr lang="en-US" dirty="0"/>
           </a:p>
@@ -3879,7 +3879,7 @@
         </p:blipFill>
         <p:spPr bwMode="auto">
           <a:xfrm>
-            <a:off x="11816126" y="3825998"/>
+            <a:off x="11883767" y="3825998"/>
             <a:ext cx="548640" cy="548640"/>
           </a:xfrm>
           <a:prstGeom prst="rect">
@@ -3926,7 +3926,7 @@
         </p:nvSpPr>
         <p:spPr bwMode="auto">
           <a:xfrm>
-            <a:off x="11607893" y="4378202"/>
+            <a:off x="11675534" y="4378202"/>
             <a:ext cx="965107" cy="498598"/>
           </a:xfrm>
           <a:prstGeom prst="rect">
@@ -4346,7 +4346,7 @@
         </p:nvSpPr>
         <p:spPr bwMode="auto">
           <a:xfrm>
-            <a:off x="1697014" y="1711202"/>
+            <a:off x="1154723" y="1711202"/>
             <a:ext cx="1655786" cy="498598"/>
           </a:xfrm>
           <a:prstGeom prst="rect">
@@ -4486,7 +4486,26 @@
                 <a:ea typeface="Amazon Ember" panose="020B0603020204020204" pitchFamily="34" charset="0"/>
                 <a:cs typeface="Arial" panose="020B0604020202020204" pitchFamily="34" charset="0"/>
               </a:rPr>
-              <a:t>Weekly CloudWatch event</a:t>
+              <a:t>CloudWatch </a:t>
+            </a:r>
+          </a:p>
+          <a:p>
+            <a:pPr algn="ctr"/>
+            <a:r>
+              <a:rPr lang="en-US" altLang="en-US" sz="1320" dirty="0">
+                <a:latin typeface="Arial" panose="020B0604020202020204" pitchFamily="34" charset="0"/>
+                <a:ea typeface="Amazon Ember" panose="020B0603020204020204" pitchFamily="34" charset="0"/>
+                <a:cs typeface="Arial" panose="020B0604020202020204" pitchFamily="34" charset="0"/>
+              </a:rPr>
+              <a:t>e</a:t>
+            </a:r>
+            <a:r>
+              <a:rPr lang="en-US" altLang="en-US" sz="1320" dirty="0" smtClean="0">
+                <a:latin typeface="Arial" panose="020B0604020202020204" pitchFamily="34" charset="0"/>
+                <a:ea typeface="Amazon Ember" panose="020B0603020204020204" pitchFamily="34" charset="0"/>
+                <a:cs typeface="Arial" panose="020B0604020202020204" pitchFamily="34" charset="0"/>
+              </a:rPr>
+              <a:t>vent (weekly)</a:t>
             </a:r>
             <a:endParaRPr lang="en-US" altLang="en-US" sz="1320" dirty="0">
               <a:latin typeface="Arial" panose="020B0604020202020204" pitchFamily="34" charset="0"/>
@@ -4525,7 +4544,7 @@
         </p:blipFill>
         <p:spPr bwMode="auto">
           <a:xfrm>
-            <a:off x="2239254" y="1194718"/>
+            <a:off x="1696963" y="1194718"/>
             <a:ext cx="548640" cy="548640"/>
           </a:xfrm>
           <a:prstGeom prst="rect">
@@ -6494,12 +6513,20 @@
               </a:rPr>
             </a:br>
             <a:r>
+              <a:rPr lang="en-US" altLang="en-US" sz="1320" dirty="0">
+                <a:latin typeface="Arial" panose="020B0604020202020204" pitchFamily="34" charset="0"/>
+                <a:ea typeface="Amazon Ember" panose="020B0603020204020204" pitchFamily="34" charset="0"/>
+                <a:cs typeface="Arial" panose="020B0604020202020204" pitchFamily="34" charset="0"/>
+              </a:rPr>
+              <a:t>r</a:t>
+            </a:r>
+            <a:r>
               <a:rPr lang="en-US" altLang="en-US" sz="1320" dirty="0" smtClean="0">
                 <a:latin typeface="Arial" panose="020B0604020202020204" pitchFamily="34" charset="0"/>
                 <a:ea typeface="Amazon Ember" panose="020B0603020204020204" pitchFamily="34" charset="0"/>
                 <a:cs typeface="Arial" panose="020B0604020202020204" pitchFamily="34" charset="0"/>
               </a:rPr>
-              <a:t>Rebuild</a:t>
+              <a:t>ebuild</a:t>
             </a:r>
             <a:r>
               <a:rPr lang="en-US" altLang="en-US" sz="1320" dirty="0">
@@ -6709,12 +6736,20 @@
               </a:rPr>
             </a:br>
             <a:r>
+              <a:rPr lang="en-US" altLang="en-US" sz="1320" dirty="0" smtClean="0">
+                <a:latin typeface="Arial" panose="020B0604020202020204" pitchFamily="34" charset="0"/>
+                <a:ea typeface="Amazon Ember" panose="020B0603020204020204" pitchFamily="34" charset="0"/>
+                <a:cs typeface="Arial" panose="020B0604020202020204" pitchFamily="34" charset="0"/>
+              </a:rPr>
+              <a:t>update </a:t>
+            </a:r>
+            <a:r>
               <a:rPr lang="en-US" altLang="en-US" sz="1320" dirty="0">
                 <a:latin typeface="Arial" panose="020B0604020202020204" pitchFamily="34" charset="0"/>
                 <a:ea typeface="Amazon Ember" panose="020B0603020204020204" pitchFamily="34" charset="0"/>
                 <a:cs typeface="Arial" panose="020B0604020202020204" pitchFamily="34" charset="0"/>
               </a:rPr>
-              <a:t>Update Duo MFA settings</a:t>
+              <a:t>Duo MFA settings</a:t>
             </a:r>
           </a:p>
         </p:txBody>
@@ -6916,12 +6951,20 @@
               </a:rPr>
             </a:br>
             <a:r>
+              <a:rPr lang="en-US" altLang="en-US" sz="1320" dirty="0" smtClean="0">
+                <a:latin typeface="Arial" panose="020B0604020202020204" pitchFamily="34" charset="0"/>
+                <a:ea typeface="Amazon Ember" panose="020B0603020204020204" pitchFamily="34" charset="0"/>
+                <a:cs typeface="Arial" panose="020B0604020202020204" pitchFamily="34" charset="0"/>
+              </a:rPr>
+              <a:t>update </a:t>
+            </a:r>
+            <a:r>
               <a:rPr lang="en-US" altLang="en-US" sz="1320" dirty="0">
                 <a:latin typeface="Arial" panose="020B0604020202020204" pitchFamily="34" charset="0"/>
                 <a:ea typeface="Amazon Ember" panose="020B0603020204020204" pitchFamily="34" charset="0"/>
                 <a:cs typeface="Arial" panose="020B0604020202020204" pitchFamily="34" charset="0"/>
               </a:rPr>
-              <a:t>Update or </a:t>
+              <a:t>or </a:t>
             </a:r>
             <a:r>
               <a:rPr lang="en-US" altLang="en-US" sz="1320" dirty="0" smtClean="0">
@@ -7016,14 +7059,12 @@
           <p:nvPr/>
         </p:nvCxnSpPr>
         <p:spPr>
-          <a:xfrm rot="5400000" flipH="1" flipV="1">
-            <a:off x="1830070" y="2356095"/>
-            <a:ext cx="841132" cy="548542"/>
-          </a:xfrm>
-          <a:prstGeom prst="bentConnector3">
-            <a:avLst>
-              <a:gd name="adj1" fmla="val 80575"/>
-            </a:avLst>
+          <a:xfrm flipV="1">
+            <a:off x="1976365" y="2209800"/>
+            <a:ext cx="6251" cy="841132"/>
+          </a:xfrm>
+          <a:prstGeom prst="straightConnector1">
+            <a:avLst/>
           </a:prstGeom>
           <a:ln w="12700">
             <a:solidFill>
@@ -7850,55 +7891,6 @@
           </a:extLst>
         </p:spPr>
       </p:pic>
-      <p:cxnSp>
-        <p:nvCxnSpPr>
-          <p:cNvPr id="76" name="Straight Arrow Connector 75">
-            <a:extLst>
-              <a:ext uri="{FF2B5EF4-FFF2-40B4-BE49-F238E27FC236}">
-                <a16:creationId xmlns:a16="http://schemas.microsoft.com/office/drawing/2014/main" id="{5C32B525-5C54-654B-AD49-0B54567AB43A}"/>
-              </a:ext>
-            </a:extLst>
-          </p:cNvPr>
-          <p:cNvCxnSpPr>
-            <a:cxnSpLocks/>
-            <a:stCxn id="94" idx="0"/>
-            <a:endCxn id="53" idx="2"/>
-          </p:cNvCxnSpPr>
-          <p:nvPr/>
-        </p:nvCxnSpPr>
-        <p:spPr>
-          <a:xfrm rot="16200000" flipV="1">
-            <a:off x="12388388" y="3229250"/>
-            <a:ext cx="830795" cy="371154"/>
-          </a:xfrm>
-          <a:prstGeom prst="bentConnector3">
-            <a:avLst>
-              <a:gd name="adj1" fmla="val 50000"/>
-            </a:avLst>
-          </a:prstGeom>
-          <a:ln w="12700">
-            <a:solidFill>
-              <a:srgbClr val="545B64"/>
-            </a:solidFill>
-            <a:headEnd type="arrow" w="med" len="sm"/>
-            <a:tailEnd type="none" w="med" len="sm"/>
-          </a:ln>
-        </p:spPr>
-        <p:style>
-          <a:lnRef idx="1">
-            <a:schemeClr val="accent1"/>
-          </a:lnRef>
-          <a:fillRef idx="0">
-            <a:schemeClr val="accent1"/>
-          </a:fillRef>
-          <a:effectRef idx="0">
-            <a:schemeClr val="accent1"/>
-          </a:effectRef>
-          <a:fontRef idx="minor">
-            <a:schemeClr val="tx1"/>
-          </a:fontRef>
-        </p:style>
-      </p:cxnSp>
       <p:sp>
         <p:nvSpPr>
           <p:cNvPr id="91" name="TextBox 16">
@@ -8307,18 +8299,18 @@
           <p:cNvCxnSpPr>
             <a:cxnSpLocks/>
             <a:stCxn id="19" idx="0"/>
-            <a:endCxn id="53" idx="2"/>
+            <a:endCxn id="94" idx="0"/>
           </p:cNvCxnSpPr>
           <p:nvPr/>
         </p:nvCxnSpPr>
         <p:spPr>
-          <a:xfrm rot="5400000" flipH="1" flipV="1">
-            <a:off x="11941043" y="3148833"/>
-            <a:ext cx="826569" cy="527762"/>
+          <a:xfrm rot="16200000" flipH="1">
+            <a:off x="12605432" y="3378653"/>
+            <a:ext cx="4226" cy="898916"/>
           </a:xfrm>
           <a:prstGeom prst="bentConnector3">
             <a:avLst>
-              <a:gd name="adj1" fmla="val 50000"/>
+              <a:gd name="adj1" fmla="val -5409371"/>
             </a:avLst>
           </a:prstGeom>
           <a:ln w="12700">
@@ -8326,7 +8318,7 @@
               <a:srgbClr val="545B64"/>
             </a:solidFill>
             <a:headEnd type="arrow" w="med" len="sm"/>
-            <a:tailEnd type="none" w="med" len="sm"/>
+            <a:tailEnd type="arrow" w="med" len="sm"/>
           </a:ln>
         </p:spPr>
         <p:style>
@@ -8852,7 +8844,7 @@
         </p:nvSpPr>
         <p:spPr bwMode="auto">
           <a:xfrm>
-            <a:off x="12446654" y="4401390"/>
+            <a:off x="12514295" y="4401390"/>
             <a:ext cx="1085416" cy="498598"/>
           </a:xfrm>
           <a:prstGeom prst="rect">
@@ -9066,7 +9058,7 @@
         </p:blipFill>
         <p:spPr bwMode="auto">
           <a:xfrm>
-            <a:off x="12715042" y="3830224"/>
+            <a:off x="12782683" y="3830224"/>
             <a:ext cx="548640" cy="548640"/>
           </a:xfrm>
           <a:prstGeom prst="rect">
@@ -9320,52 +9312,6 @@
       </p:pic>
       <p:sp>
         <p:nvSpPr>
-          <p:cNvPr id="86" name="Rectangle 85"/>
-          <p:cNvSpPr/>
-          <p:nvPr/>
-        </p:nvSpPr>
-        <p:spPr>
-          <a:xfrm>
-            <a:off x="1619750" y="2594189"/>
-            <a:ext cx="1823969" cy="275734"/>
-          </a:xfrm>
-          <a:prstGeom prst="rect">
-            <a:avLst/>
-          </a:prstGeom>
-          <a:solidFill>
-            <a:schemeClr val="bg1"/>
-          </a:solidFill>
-          <a:ln>
-            <a:noFill/>
-          </a:ln>
-        </p:spPr>
-        <p:style>
-          <a:lnRef idx="2">
-            <a:schemeClr val="accent1">
-              <a:shade val="50000"/>
-            </a:schemeClr>
-          </a:lnRef>
-          <a:fillRef idx="1">
-            <a:schemeClr val="accent1"/>
-          </a:fillRef>
-          <a:effectRef idx="0">
-            <a:schemeClr val="accent1"/>
-          </a:effectRef>
-          <a:fontRef idx="minor">
-            <a:schemeClr val="lt1"/>
-          </a:fontRef>
-        </p:style>
-        <p:txBody>
-          <a:bodyPr rtlCol="0" anchor="ctr"/>
-          <a:lstStyle/>
-          <a:p>
-            <a:pPr algn="ctr"/>
-            <a:endParaRPr lang="en-US" sz="2592" dirty="0"/>
-          </a:p>
-        </p:txBody>
-      </p:sp>
-      <p:sp>
-        <p:nvSpPr>
           <p:cNvPr id="89" name="Rectangle 88">
             <a:extLst>
               <a:ext uri="{FF2B5EF4-FFF2-40B4-BE49-F238E27FC236}">
@@ -9378,8 +9324,8 @@
         </p:nvSpPr>
         <p:spPr>
           <a:xfrm>
-            <a:off x="1373458" y="2523842"/>
-            <a:ext cx="2302620" cy="3857429"/>
+            <a:off x="1373458" y="2382524"/>
+            <a:ext cx="2302620" cy="3998747"/>
           </a:xfrm>
           <a:prstGeom prst="rect">
             <a:avLst/>
@@ -9423,7 +9369,26 @@
                 <a:latin typeface="Arial" panose="020B0604020202020204" pitchFamily="34" charset="0"/>
                 <a:cs typeface="Arial" panose="020B0604020202020204" pitchFamily="34" charset="0"/>
               </a:rPr>
-              <a:t>Image deployment</a:t>
+              <a:t>Image</a:t>
+            </a:r>
+            <a:br>
+              <a:rPr lang="en-US" sz="1320" dirty="0" smtClean="0">
+                <a:solidFill>
+                  <a:srgbClr val="5A6B86"/>
+                </a:solidFill>
+                <a:latin typeface="Arial" panose="020B0604020202020204" pitchFamily="34" charset="0"/>
+                <a:cs typeface="Arial" panose="020B0604020202020204" pitchFamily="34" charset="0"/>
+              </a:rPr>
+            </a:br>
+            <a:r>
+              <a:rPr lang="en-US" sz="1320" dirty="0" smtClean="0">
+                <a:solidFill>
+                  <a:srgbClr val="5A6B86"/>
+                </a:solidFill>
+                <a:latin typeface="Arial" panose="020B0604020202020204" pitchFamily="34" charset="0"/>
+                <a:cs typeface="Arial" panose="020B0604020202020204" pitchFamily="34" charset="0"/>
+              </a:rPr>
+              <a:t>deployment</a:t>
             </a:r>
             <a:endParaRPr lang="en-US" sz="1320" dirty="0">
               <a:solidFill>
@@ -10263,6 +10228,43 @@
           </a:p>
         </p:txBody>
       </p:sp>
+      <p:cxnSp>
+        <p:nvCxnSpPr>
+          <p:cNvPr id="109" name="Straight Connector 108"/>
+          <p:cNvCxnSpPr>
+            <a:stCxn id="53" idx="2"/>
+          </p:cNvCxnSpPr>
+          <p:nvPr/>
+        </p:nvCxnSpPr>
+        <p:spPr>
+          <a:xfrm>
+            <a:off x="12618208" y="2999429"/>
+            <a:ext cx="0" cy="608757"/>
+          </a:xfrm>
+          <a:prstGeom prst="line">
+            <a:avLst/>
+          </a:prstGeom>
+          <a:ln w="12700">
+            <a:solidFill>
+              <a:srgbClr val="545B64"/>
+            </a:solidFill>
+          </a:ln>
+        </p:spPr>
+        <p:style>
+          <a:lnRef idx="1">
+            <a:schemeClr val="accent1"/>
+          </a:lnRef>
+          <a:fillRef idx="0">
+            <a:schemeClr val="accent1"/>
+          </a:fillRef>
+          <a:effectRef idx="0">
+            <a:schemeClr val="accent1"/>
+          </a:effectRef>
+          <a:fontRef idx="minor">
+            <a:schemeClr val="tx1"/>
+          </a:fontRef>
+        </p:style>
+      </p:cxnSp>
     </p:spTree>
     <p:extLst>
       <p:ext uri="{BB962C8B-B14F-4D97-AF65-F5344CB8AC3E}">

</xml_diff>